<commit_message>
Updated Process data app
</commit_message>
<xml_diff>
--- a/PlotlyDashboard.pptx
+++ b/PlotlyDashboard.pptx
@@ -4907,7 +4907,7 @@
       </p:sp>
       <p:pic>
         <p:nvPicPr>
-          <p:cNvPr id="6" name="Picture 5" descr="Screen Clipping"/>
+          <p:cNvPr id="5" name="Picture 4" descr="Screen Clipping"/>
           <p:cNvPicPr>
             <a:picLocks noChangeAspect="1"/>
           </p:cNvPicPr>
@@ -4927,8 +4927,8 @@
         </p:blipFill>
         <p:spPr>
           <a:xfrm>
-            <a:off x="-18197" y="0"/>
-            <a:ext cx="9144000" cy="6858000"/>
+            <a:off x="0" y="685800"/>
+            <a:ext cx="9144000" cy="6172200"/>
           </a:xfrm>
           <a:prstGeom prst="rect">
             <a:avLst/>
@@ -5465,6 +5465,13 @@
   <p:clrMapOvr>
     <a:masterClrMapping/>
   </p:clrMapOvr>
+  <p:timing>
+    <p:tnLst>
+      <p:par>
+        <p:cTn id="1" dur="indefinite" restart="never" nodeType="tmRoot"/>
+      </p:par>
+    </p:tnLst>
+  </p:timing>
 </p:sld>
 </file>
 

</xml_diff>

<commit_message>
Migrated with dash 1.0.0
</commit_message>
<xml_diff>
--- a/PlotlyDashboard.pptx
+++ b/PlotlyDashboard.pptx
@@ -8,22 +8,27 @@
     <p:sldId id="267" r:id="rId2"/>
     <p:sldId id="265" r:id="rId3"/>
     <p:sldId id="269" r:id="rId4"/>
-    <p:sldId id="270" r:id="rId5"/>
-    <p:sldId id="271" r:id="rId6"/>
-    <p:sldId id="272" r:id="rId7"/>
-    <p:sldId id="273" r:id="rId8"/>
-    <p:sldId id="274" r:id="rId9"/>
-    <p:sldId id="275" r:id="rId10"/>
-    <p:sldId id="276" r:id="rId11"/>
-    <p:sldId id="277" r:id="rId12"/>
-    <p:sldId id="278" r:id="rId13"/>
-    <p:sldId id="279" r:id="rId14"/>
-    <p:sldId id="280" r:id="rId15"/>
-    <p:sldId id="281" r:id="rId16"/>
-    <p:sldId id="282" r:id="rId17"/>
-    <p:sldId id="283" r:id="rId18"/>
-    <p:sldId id="284" r:id="rId19"/>
-    <p:sldId id="285" r:id="rId20"/>
+    <p:sldId id="287" r:id="rId5"/>
+    <p:sldId id="288" r:id="rId6"/>
+    <p:sldId id="289" r:id="rId7"/>
+    <p:sldId id="290" r:id="rId8"/>
+    <p:sldId id="270" r:id="rId9"/>
+    <p:sldId id="271" r:id="rId10"/>
+    <p:sldId id="272" r:id="rId11"/>
+    <p:sldId id="273" r:id="rId12"/>
+    <p:sldId id="274" r:id="rId13"/>
+    <p:sldId id="275" r:id="rId14"/>
+    <p:sldId id="276" r:id="rId15"/>
+    <p:sldId id="277" r:id="rId16"/>
+    <p:sldId id="278" r:id="rId17"/>
+    <p:sldId id="279" r:id="rId18"/>
+    <p:sldId id="280" r:id="rId19"/>
+    <p:sldId id="281" r:id="rId20"/>
+    <p:sldId id="282" r:id="rId21"/>
+    <p:sldId id="283" r:id="rId22"/>
+    <p:sldId id="284" r:id="rId23"/>
+    <p:sldId id="286" r:id="rId24"/>
+    <p:sldId id="285" r:id="rId25"/>
   </p:sldIdLst>
   <p:sldSz cx="9144000" cy="6858000" type="screen4x3"/>
   <p:notesSz cx="6858000" cy="9144000"/>
@@ -122,6 +127,22 @@
       </a:defRPr>
     </a:lvl9pPr>
   </p:defaultTextStyle>
+  <p:extLst>
+    <p:ext uri="{EFAFB233-063F-42B5-8137-9DF3F51BA10A}">
+      <p15:sldGuideLst xmlns:p15="http://schemas.microsoft.com/office/powerpoint/2012/main">
+        <p15:guide id="1" orient="horz" pos="2160">
+          <p15:clr>
+            <a:srgbClr val="A4A3A4"/>
+          </p15:clr>
+        </p15:guide>
+        <p15:guide id="2" pos="2880">
+          <p15:clr>
+            <a:srgbClr val="A4A3A4"/>
+          </p15:clr>
+        </p15:guide>
+      </p15:sldGuideLst>
+    </p:ext>
+  </p:extLst>
 </p:presentation>
 </file>
 
@@ -307,7 +328,7 @@
             <a:fld id="{1D8BD707-D9CF-40AE-B4C6-C98DA3205C09}" type="datetimeFigureOut">
               <a:rPr lang="en-US" smtClean="0"/>
               <a:pPr/>
-              <a:t>5/20/2019</a:t>
+              <a:t>6/7/2019</a:t>
             </a:fld>
             <a:endParaRPr lang="en-US"/>
           </a:p>
@@ -474,7 +495,7 @@
             <a:fld id="{1D8BD707-D9CF-40AE-B4C6-C98DA3205C09}" type="datetimeFigureOut">
               <a:rPr lang="en-US" smtClean="0"/>
               <a:pPr/>
-              <a:t>5/20/2019</a:t>
+              <a:t>6/7/2019</a:t>
             </a:fld>
             <a:endParaRPr lang="en-US"/>
           </a:p>
@@ -651,7 +672,7 @@
             <a:fld id="{1D8BD707-D9CF-40AE-B4C6-C98DA3205C09}" type="datetimeFigureOut">
               <a:rPr lang="en-US" smtClean="0"/>
               <a:pPr/>
-              <a:t>5/20/2019</a:t>
+              <a:t>6/7/2019</a:t>
             </a:fld>
             <a:endParaRPr lang="en-US"/>
           </a:p>
@@ -982,7 +1003,7 @@
           <a:p>
             <a:fld id="{5F5C7AA8-AF19-4FCF-98FD-FB8AFEA87A63}" type="datetime4">
               <a:rPr lang="en-US" smtClean="0"/>
-              <a:t>May 20, 2019</a:t>
+              <a:t>June 7, 2019</a:t>
             </a:fld>
             <a:endParaRPr lang="de-DE"/>
           </a:p>
@@ -1444,7 +1465,7 @@
           <a:p>
             <a:fld id="{7299A5CA-AD6E-4AA7-8DB6-450461B77045}" type="datetime4">
               <a:rPr lang="en-US" smtClean="0"/>
-              <a:t>May 20, 2019</a:t>
+              <a:t>June 7, 2019</a:t>
             </a:fld>
             <a:endParaRPr lang="de-DE"/>
           </a:p>
@@ -1786,7 +1807,7 @@
             <a:fld id="{1D8BD707-D9CF-40AE-B4C6-C98DA3205C09}" type="datetimeFigureOut">
               <a:rPr lang="en-US" smtClean="0"/>
               <a:pPr/>
-              <a:t>5/20/2019</a:t>
+              <a:t>6/7/2019</a:t>
             </a:fld>
             <a:endParaRPr lang="en-US"/>
           </a:p>
@@ -2029,7 +2050,7 @@
             <a:fld id="{1D8BD707-D9CF-40AE-B4C6-C98DA3205C09}" type="datetimeFigureOut">
               <a:rPr lang="en-US" smtClean="0"/>
               <a:pPr/>
-              <a:t>5/20/2019</a:t>
+              <a:t>6/7/2019</a:t>
             </a:fld>
             <a:endParaRPr lang="en-US"/>
           </a:p>
@@ -2314,7 +2335,7 @@
             <a:fld id="{1D8BD707-D9CF-40AE-B4C6-C98DA3205C09}" type="datetimeFigureOut">
               <a:rPr lang="en-US" smtClean="0"/>
               <a:pPr/>
-              <a:t>5/20/2019</a:t>
+              <a:t>6/7/2019</a:t>
             </a:fld>
             <a:endParaRPr lang="en-US"/>
           </a:p>
@@ -2733,7 +2754,7 @@
             <a:fld id="{1D8BD707-D9CF-40AE-B4C6-C98DA3205C09}" type="datetimeFigureOut">
               <a:rPr lang="en-US" smtClean="0"/>
               <a:pPr/>
-              <a:t>5/20/2019</a:t>
+              <a:t>6/7/2019</a:t>
             </a:fld>
             <a:endParaRPr lang="en-US"/>
           </a:p>
@@ -2848,7 +2869,7 @@
             <a:fld id="{1D8BD707-D9CF-40AE-B4C6-C98DA3205C09}" type="datetimeFigureOut">
               <a:rPr lang="en-US" smtClean="0"/>
               <a:pPr/>
-              <a:t>5/20/2019</a:t>
+              <a:t>6/7/2019</a:t>
             </a:fld>
             <a:endParaRPr lang="en-US"/>
           </a:p>
@@ -2940,7 +2961,7 @@
             <a:fld id="{1D8BD707-D9CF-40AE-B4C6-C98DA3205C09}" type="datetimeFigureOut">
               <a:rPr lang="en-US" smtClean="0"/>
               <a:pPr/>
-              <a:t>5/20/2019</a:t>
+              <a:t>6/7/2019</a:t>
             </a:fld>
             <a:endParaRPr lang="en-US"/>
           </a:p>
@@ -3214,7 +3235,7 @@
             <a:fld id="{1D8BD707-D9CF-40AE-B4C6-C98DA3205C09}" type="datetimeFigureOut">
               <a:rPr lang="en-US" smtClean="0"/>
               <a:pPr/>
-              <a:t>5/20/2019</a:t>
+              <a:t>6/7/2019</a:t>
             </a:fld>
             <a:endParaRPr lang="en-US"/>
           </a:p>
@@ -3464,7 +3485,7 @@
             <a:fld id="{1D8BD707-D9CF-40AE-B4C6-C98DA3205C09}" type="datetimeFigureOut">
               <a:rPr lang="en-US" smtClean="0"/>
               <a:pPr/>
-              <a:t>5/20/2019</a:t>
+              <a:t>6/7/2019</a:t>
             </a:fld>
             <a:endParaRPr lang="en-US"/>
           </a:p>
@@ -3674,7 +3695,7 @@
             <a:fld id="{1D8BD707-D9CF-40AE-B4C6-C98DA3205C09}" type="datetimeFigureOut">
               <a:rPr lang="en-US" smtClean="0"/>
               <a:pPr/>
-              <a:t>5/20/2019</a:t>
+              <a:t>6/7/2019</a:t>
             </a:fld>
             <a:endParaRPr lang="en-US"/>
           </a:p>
@@ -4308,7 +4329,503 @@
         <p:spPr>
           <a:xfrm>
             <a:off x="0" y="0"/>
+            <a:ext cx="9144000" cy="6858000"/>
+          </a:xfrm>
+          <a:prstGeom prst="rect">
+            <a:avLst/>
+          </a:prstGeom>
+        </p:spPr>
+      </p:pic>
+    </p:spTree>
+    <p:extLst>
+      <p:ext uri="{BB962C8B-B14F-4D97-AF65-F5344CB8AC3E}">
+        <p14:creationId xmlns:p14="http://schemas.microsoft.com/office/powerpoint/2010/main" val="2467848603"/>
+      </p:ext>
+    </p:extLst>
+  </p:cSld>
+  <p:clrMapOvr>
+    <a:masterClrMapping/>
+  </p:clrMapOvr>
+  <p:timing>
+    <p:tnLst>
+      <p:par>
+        <p:cTn id="1" dur="indefinite" restart="never" nodeType="tmRoot"/>
+      </p:par>
+    </p:tnLst>
+  </p:timing>
+</p:sld>
+</file>
+
+<file path=ppt/slides/slide11.xml><?xml version="1.0" encoding="utf-8"?>
+<p:sld xmlns:a="http://schemas.openxmlformats.org/drawingml/2006/main" xmlns:r="http://schemas.openxmlformats.org/officeDocument/2006/relationships" xmlns:p="http://schemas.openxmlformats.org/presentationml/2006/main">
+  <p:cSld>
+    <p:spTree>
+      <p:nvGrpSpPr>
+        <p:cNvPr id="1" name=""/>
+        <p:cNvGrpSpPr/>
+        <p:nvPr/>
+      </p:nvGrpSpPr>
+      <p:grpSpPr>
+        <a:xfrm>
+          <a:off x="0" y="0"/>
+          <a:ext cx="0" cy="0"/>
+          <a:chOff x="0" y="0"/>
+          <a:chExt cx="0" cy="0"/>
+        </a:xfrm>
+      </p:grpSpPr>
+      <p:sp>
+        <p:nvSpPr>
+          <p:cNvPr id="2" name="Text Placeholder 1"/>
+          <p:cNvSpPr>
+            <a:spLocks noGrp="1"/>
+          </p:cNvSpPr>
+          <p:nvPr>
+            <p:ph type="body" sz="quarter" idx="14"/>
+          </p:nvPr>
+        </p:nvSpPr>
+        <p:spPr/>
+        <p:txBody>
+          <a:bodyPr/>
+          <a:lstStyle/>
+          <a:p>
+            <a:endParaRPr lang="en-US"/>
+          </a:p>
+        </p:txBody>
+      </p:sp>
+      <p:sp>
+        <p:nvSpPr>
+          <p:cNvPr id="3" name="Text Placeholder 2"/>
+          <p:cNvSpPr>
+            <a:spLocks noGrp="1"/>
+          </p:cNvSpPr>
+          <p:nvPr>
+            <p:ph type="body" sz="quarter" idx="13"/>
+          </p:nvPr>
+        </p:nvSpPr>
+        <p:spPr/>
+        <p:txBody>
+          <a:bodyPr/>
+          <a:lstStyle/>
+          <a:p>
+            <a:endParaRPr lang="en-US"/>
+          </a:p>
+        </p:txBody>
+      </p:sp>
+      <p:sp>
+        <p:nvSpPr>
+          <p:cNvPr id="4" name="Title 3"/>
+          <p:cNvSpPr>
+            <a:spLocks noGrp="1"/>
+          </p:cNvSpPr>
+          <p:nvPr>
+            <p:ph type="title"/>
+          </p:nvPr>
+        </p:nvSpPr>
+        <p:spPr/>
+        <p:txBody>
+          <a:bodyPr/>
+          <a:lstStyle/>
+          <a:p>
+            <a:endParaRPr lang="en-US"/>
+          </a:p>
+        </p:txBody>
+      </p:sp>
+      <p:pic>
+        <p:nvPicPr>
+          <p:cNvPr id="5" name="Picture 4" descr="Screen Clipping"/>
+          <p:cNvPicPr>
+            <a:picLocks noChangeAspect="1"/>
+          </p:cNvPicPr>
+          <p:nvPr/>
+        </p:nvPicPr>
+        <p:blipFill>
+          <a:blip r:embed="rId2">
+            <a:extLst>
+              <a:ext uri="{28A0092B-C50C-407E-A947-70E740481C1C}">
+                <a14:useLocalDpi xmlns:a14="http://schemas.microsoft.com/office/drawing/2010/main" val="0"/>
+              </a:ext>
+            </a:extLst>
+          </a:blip>
+          <a:stretch>
+            <a:fillRect/>
+          </a:stretch>
+        </p:blipFill>
+        <p:spPr>
+          <a:xfrm>
+            <a:off x="0" y="0"/>
             <a:ext cx="9144000" cy="6857999"/>
+          </a:xfrm>
+          <a:prstGeom prst="rect">
+            <a:avLst/>
+          </a:prstGeom>
+        </p:spPr>
+      </p:pic>
+    </p:spTree>
+    <p:extLst>
+      <p:ext uri="{BB962C8B-B14F-4D97-AF65-F5344CB8AC3E}">
+        <p14:creationId xmlns:p14="http://schemas.microsoft.com/office/powerpoint/2010/main" val="869784362"/>
+      </p:ext>
+    </p:extLst>
+  </p:cSld>
+  <p:clrMapOvr>
+    <a:masterClrMapping/>
+  </p:clrMapOvr>
+  <p:timing>
+    <p:tnLst>
+      <p:par>
+        <p:cTn id="1" dur="indefinite" restart="never" nodeType="tmRoot"/>
+      </p:par>
+    </p:tnLst>
+  </p:timing>
+</p:sld>
+</file>
+
+<file path=ppt/slides/slide12.xml><?xml version="1.0" encoding="utf-8"?>
+<p:sld xmlns:a="http://schemas.openxmlformats.org/drawingml/2006/main" xmlns:r="http://schemas.openxmlformats.org/officeDocument/2006/relationships" xmlns:p="http://schemas.openxmlformats.org/presentationml/2006/main">
+  <p:cSld>
+    <p:spTree>
+      <p:nvGrpSpPr>
+        <p:cNvPr id="1" name=""/>
+        <p:cNvGrpSpPr/>
+        <p:nvPr/>
+      </p:nvGrpSpPr>
+      <p:grpSpPr>
+        <a:xfrm>
+          <a:off x="0" y="0"/>
+          <a:ext cx="0" cy="0"/>
+          <a:chOff x="0" y="0"/>
+          <a:chExt cx="0" cy="0"/>
+        </a:xfrm>
+      </p:grpSpPr>
+      <p:sp>
+        <p:nvSpPr>
+          <p:cNvPr id="2" name="Text Placeholder 1"/>
+          <p:cNvSpPr>
+            <a:spLocks noGrp="1"/>
+          </p:cNvSpPr>
+          <p:nvPr>
+            <p:ph type="body" sz="quarter" idx="14"/>
+          </p:nvPr>
+        </p:nvSpPr>
+        <p:spPr/>
+        <p:txBody>
+          <a:bodyPr/>
+          <a:lstStyle/>
+          <a:p>
+            <a:endParaRPr lang="en-US"/>
+          </a:p>
+        </p:txBody>
+      </p:sp>
+      <p:sp>
+        <p:nvSpPr>
+          <p:cNvPr id="3" name="Text Placeholder 2"/>
+          <p:cNvSpPr>
+            <a:spLocks noGrp="1"/>
+          </p:cNvSpPr>
+          <p:nvPr>
+            <p:ph type="body" sz="quarter" idx="13"/>
+          </p:nvPr>
+        </p:nvSpPr>
+        <p:spPr/>
+        <p:txBody>
+          <a:bodyPr/>
+          <a:lstStyle/>
+          <a:p>
+            <a:endParaRPr lang="en-US"/>
+          </a:p>
+        </p:txBody>
+      </p:sp>
+      <p:sp>
+        <p:nvSpPr>
+          <p:cNvPr id="4" name="Title 3"/>
+          <p:cNvSpPr>
+            <a:spLocks noGrp="1"/>
+          </p:cNvSpPr>
+          <p:nvPr>
+            <p:ph type="title"/>
+          </p:nvPr>
+        </p:nvSpPr>
+        <p:spPr/>
+        <p:txBody>
+          <a:bodyPr/>
+          <a:lstStyle/>
+          <a:p>
+            <a:endParaRPr lang="en-US"/>
+          </a:p>
+        </p:txBody>
+      </p:sp>
+      <p:pic>
+        <p:nvPicPr>
+          <p:cNvPr id="5" name="Picture 4" descr="Screen Clipping"/>
+          <p:cNvPicPr>
+            <a:picLocks noChangeAspect="1"/>
+          </p:cNvPicPr>
+          <p:nvPr/>
+        </p:nvPicPr>
+        <p:blipFill>
+          <a:blip r:embed="rId2">
+            <a:extLst>
+              <a:ext uri="{28A0092B-C50C-407E-A947-70E740481C1C}">
+                <a14:useLocalDpi xmlns:a14="http://schemas.microsoft.com/office/drawing/2010/main" val="0"/>
+              </a:ext>
+            </a:extLst>
+          </a:blip>
+          <a:stretch>
+            <a:fillRect/>
+          </a:stretch>
+        </p:blipFill>
+        <p:spPr>
+          <a:xfrm>
+            <a:off x="0" y="0"/>
+            <a:ext cx="9144000" cy="6857999"/>
+          </a:xfrm>
+          <a:prstGeom prst="rect">
+            <a:avLst/>
+          </a:prstGeom>
+        </p:spPr>
+      </p:pic>
+    </p:spTree>
+    <p:extLst>
+      <p:ext uri="{BB962C8B-B14F-4D97-AF65-F5344CB8AC3E}">
+        <p14:creationId xmlns:p14="http://schemas.microsoft.com/office/powerpoint/2010/main" val="3674566202"/>
+      </p:ext>
+    </p:extLst>
+  </p:cSld>
+  <p:clrMapOvr>
+    <a:masterClrMapping/>
+  </p:clrMapOvr>
+  <p:timing>
+    <p:tnLst>
+      <p:par>
+        <p:cTn id="1" dur="indefinite" restart="never" nodeType="tmRoot"/>
+      </p:par>
+    </p:tnLst>
+  </p:timing>
+</p:sld>
+</file>
+
+<file path=ppt/slides/slide13.xml><?xml version="1.0" encoding="utf-8"?>
+<p:sld xmlns:a="http://schemas.openxmlformats.org/drawingml/2006/main" xmlns:r="http://schemas.openxmlformats.org/officeDocument/2006/relationships" xmlns:p="http://schemas.openxmlformats.org/presentationml/2006/main">
+  <p:cSld>
+    <p:spTree>
+      <p:nvGrpSpPr>
+        <p:cNvPr id="1" name=""/>
+        <p:cNvGrpSpPr/>
+        <p:nvPr/>
+      </p:nvGrpSpPr>
+      <p:grpSpPr>
+        <a:xfrm>
+          <a:off x="0" y="0"/>
+          <a:ext cx="0" cy="0"/>
+          <a:chOff x="0" y="0"/>
+          <a:chExt cx="0" cy="0"/>
+        </a:xfrm>
+      </p:grpSpPr>
+      <p:sp>
+        <p:nvSpPr>
+          <p:cNvPr id="2" name="Text Placeholder 1"/>
+          <p:cNvSpPr>
+            <a:spLocks noGrp="1"/>
+          </p:cNvSpPr>
+          <p:nvPr>
+            <p:ph type="body" sz="quarter" idx="14"/>
+          </p:nvPr>
+        </p:nvSpPr>
+        <p:spPr/>
+        <p:txBody>
+          <a:bodyPr/>
+          <a:lstStyle/>
+          <a:p>
+            <a:endParaRPr lang="en-US"/>
+          </a:p>
+        </p:txBody>
+      </p:sp>
+      <p:sp>
+        <p:nvSpPr>
+          <p:cNvPr id="3" name="Text Placeholder 2"/>
+          <p:cNvSpPr>
+            <a:spLocks noGrp="1"/>
+          </p:cNvSpPr>
+          <p:nvPr>
+            <p:ph type="body" sz="quarter" idx="13"/>
+          </p:nvPr>
+        </p:nvSpPr>
+        <p:spPr/>
+        <p:txBody>
+          <a:bodyPr/>
+          <a:lstStyle/>
+          <a:p>
+            <a:endParaRPr lang="en-US"/>
+          </a:p>
+        </p:txBody>
+      </p:sp>
+      <p:sp>
+        <p:nvSpPr>
+          <p:cNvPr id="4" name="Title 3"/>
+          <p:cNvSpPr>
+            <a:spLocks noGrp="1"/>
+          </p:cNvSpPr>
+          <p:nvPr>
+            <p:ph type="title"/>
+          </p:nvPr>
+        </p:nvSpPr>
+        <p:spPr/>
+        <p:txBody>
+          <a:bodyPr/>
+          <a:lstStyle/>
+          <a:p>
+            <a:endParaRPr lang="en-US"/>
+          </a:p>
+        </p:txBody>
+      </p:sp>
+      <p:pic>
+        <p:nvPicPr>
+          <p:cNvPr id="5" name="Picture 4" descr="Screen Clipping"/>
+          <p:cNvPicPr>
+            <a:picLocks noChangeAspect="1"/>
+          </p:cNvPicPr>
+          <p:nvPr/>
+        </p:nvPicPr>
+        <p:blipFill>
+          <a:blip r:embed="rId2">
+            <a:extLst>
+              <a:ext uri="{28A0092B-C50C-407E-A947-70E740481C1C}">
+                <a14:useLocalDpi xmlns:a14="http://schemas.microsoft.com/office/drawing/2010/main" val="0"/>
+              </a:ext>
+            </a:extLst>
+          </a:blip>
+          <a:stretch>
+            <a:fillRect/>
+          </a:stretch>
+        </p:blipFill>
+        <p:spPr>
+          <a:xfrm>
+            <a:off x="0" y="0"/>
+            <a:ext cx="9144000" cy="6858000"/>
+          </a:xfrm>
+          <a:prstGeom prst="rect">
+            <a:avLst/>
+          </a:prstGeom>
+        </p:spPr>
+      </p:pic>
+    </p:spTree>
+    <p:extLst>
+      <p:ext uri="{BB962C8B-B14F-4D97-AF65-F5344CB8AC3E}">
+        <p14:creationId xmlns:p14="http://schemas.microsoft.com/office/powerpoint/2010/main" val="1273004193"/>
+      </p:ext>
+    </p:extLst>
+  </p:cSld>
+  <p:clrMapOvr>
+    <a:masterClrMapping/>
+  </p:clrMapOvr>
+  <p:timing>
+    <p:tnLst>
+      <p:par>
+        <p:cTn id="1" dur="indefinite" restart="never" nodeType="tmRoot"/>
+      </p:par>
+    </p:tnLst>
+  </p:timing>
+</p:sld>
+</file>
+
+<file path=ppt/slides/slide14.xml><?xml version="1.0" encoding="utf-8"?>
+<p:sld xmlns:a="http://schemas.openxmlformats.org/drawingml/2006/main" xmlns:r="http://schemas.openxmlformats.org/officeDocument/2006/relationships" xmlns:p="http://schemas.openxmlformats.org/presentationml/2006/main">
+  <p:cSld>
+    <p:spTree>
+      <p:nvGrpSpPr>
+        <p:cNvPr id="1" name=""/>
+        <p:cNvGrpSpPr/>
+        <p:nvPr/>
+      </p:nvGrpSpPr>
+      <p:grpSpPr>
+        <a:xfrm>
+          <a:off x="0" y="0"/>
+          <a:ext cx="0" cy="0"/>
+          <a:chOff x="0" y="0"/>
+          <a:chExt cx="0" cy="0"/>
+        </a:xfrm>
+      </p:grpSpPr>
+      <p:sp>
+        <p:nvSpPr>
+          <p:cNvPr id="2" name="Text Placeholder 1"/>
+          <p:cNvSpPr>
+            <a:spLocks noGrp="1"/>
+          </p:cNvSpPr>
+          <p:nvPr>
+            <p:ph type="body" sz="quarter" idx="14"/>
+          </p:nvPr>
+        </p:nvSpPr>
+        <p:spPr/>
+        <p:txBody>
+          <a:bodyPr/>
+          <a:lstStyle/>
+          <a:p>
+            <a:endParaRPr lang="en-US"/>
+          </a:p>
+        </p:txBody>
+      </p:sp>
+      <p:sp>
+        <p:nvSpPr>
+          <p:cNvPr id="3" name="Text Placeholder 2"/>
+          <p:cNvSpPr>
+            <a:spLocks noGrp="1"/>
+          </p:cNvSpPr>
+          <p:nvPr>
+            <p:ph type="body" sz="quarter" idx="13"/>
+          </p:nvPr>
+        </p:nvSpPr>
+        <p:spPr/>
+        <p:txBody>
+          <a:bodyPr/>
+          <a:lstStyle/>
+          <a:p>
+            <a:endParaRPr lang="en-US"/>
+          </a:p>
+        </p:txBody>
+      </p:sp>
+      <p:sp>
+        <p:nvSpPr>
+          <p:cNvPr id="4" name="Title 3"/>
+          <p:cNvSpPr>
+            <a:spLocks noGrp="1"/>
+          </p:cNvSpPr>
+          <p:nvPr>
+            <p:ph type="title"/>
+          </p:nvPr>
+        </p:nvSpPr>
+        <p:spPr/>
+        <p:txBody>
+          <a:bodyPr/>
+          <a:lstStyle/>
+          <a:p>
+            <a:endParaRPr lang="en-US"/>
+          </a:p>
+        </p:txBody>
+      </p:sp>
+      <p:pic>
+        <p:nvPicPr>
+          <p:cNvPr id="6" name="Picture 5" descr="Screen Clipping"/>
+          <p:cNvPicPr>
+            <a:picLocks noChangeAspect="1"/>
+          </p:cNvPicPr>
+          <p:nvPr/>
+        </p:nvPicPr>
+        <p:blipFill>
+          <a:blip r:embed="rId2">
+            <a:extLst>
+              <a:ext uri="{28A0092B-C50C-407E-A947-70E740481C1C}">
+                <a14:useLocalDpi xmlns:a14="http://schemas.microsoft.com/office/drawing/2010/main" val="0"/>
+              </a:ext>
+            </a:extLst>
+          </a:blip>
+          <a:stretch>
+            <a:fillRect/>
+          </a:stretch>
+        </p:blipFill>
+        <p:spPr>
+          <a:xfrm>
+            <a:off x="0" y="685801"/>
+            <a:ext cx="9144000" cy="6172200"/>
           </a:xfrm>
           <a:prstGeom prst="rect">
             <a:avLst/>
@@ -4335,7 +4852,7 @@
 </p:sld>
 </file>
 
-<file path=ppt/slides/slide11.xml><?xml version="1.0" encoding="utf-8"?>
+<file path=ppt/slides/slide15.xml><?xml version="1.0" encoding="utf-8"?>
 <p:sld xmlns:a="http://schemas.openxmlformats.org/drawingml/2006/main" xmlns:r="http://schemas.openxmlformats.org/officeDocument/2006/relationships" xmlns:p="http://schemas.openxmlformats.org/presentationml/2006/main">
   <p:cSld>
     <p:spTree>
@@ -4459,7 +4976,7 @@
 </p:sld>
 </file>
 
-<file path=ppt/slides/slide12.xml><?xml version="1.0" encoding="utf-8"?>
+<file path=ppt/slides/slide16.xml><?xml version="1.0" encoding="utf-8"?>
 <p:sld xmlns:a="http://schemas.openxmlformats.org/drawingml/2006/main" xmlns:r="http://schemas.openxmlformats.org/officeDocument/2006/relationships" xmlns:p="http://schemas.openxmlformats.org/presentationml/2006/main">
   <p:cSld>
     <p:spTree>
@@ -4535,7 +5052,7 @@
       </p:sp>
       <p:pic>
         <p:nvPicPr>
-          <p:cNvPr id="5" name="Picture 4" descr="Screen Clipping"/>
+          <p:cNvPr id="6" name="Picture 5" descr="Screen Clipping"/>
           <p:cNvPicPr>
             <a:picLocks noChangeAspect="1"/>
           </p:cNvPicPr>
@@ -4555,8 +5072,8 @@
         </p:blipFill>
         <p:spPr>
           <a:xfrm>
-            <a:off x="32703" y="685800"/>
-            <a:ext cx="9078593" cy="6172200"/>
+            <a:off x="1" y="685800"/>
+            <a:ext cx="9144000" cy="6172200"/>
           </a:xfrm>
           <a:prstGeom prst="rect">
             <a:avLst/>
@@ -4583,7 +5100,7 @@
 </p:sld>
 </file>
 
-<file path=ppt/slides/slide13.xml><?xml version="1.0" encoding="utf-8"?>
+<file path=ppt/slides/slide17.xml><?xml version="1.0" encoding="utf-8"?>
 <p:sld xmlns:a="http://schemas.openxmlformats.org/drawingml/2006/main" xmlns:r="http://schemas.openxmlformats.org/officeDocument/2006/relationships" xmlns:p="http://schemas.openxmlformats.org/presentationml/2006/main">
   <p:cSld>
     <p:spTree>
@@ -4659,7 +5176,7 @@
       </p:sp>
       <p:pic>
         <p:nvPicPr>
-          <p:cNvPr id="5" name="Picture 4" descr="Screen Clipping"/>
+          <p:cNvPr id="6" name="Picture 5" descr="Screen Clipping"/>
           <p:cNvPicPr>
             <a:picLocks noChangeAspect="1"/>
           </p:cNvPicPr>
@@ -4680,7 +5197,7 @@
         <p:spPr>
           <a:xfrm>
             <a:off x="0" y="685800"/>
-            <a:ext cx="9143999" cy="6172199"/>
+            <a:ext cx="9144000" cy="6095999"/>
           </a:xfrm>
           <a:prstGeom prst="rect">
             <a:avLst/>
@@ -4707,7 +5224,7 @@
 </p:sld>
 </file>
 
-<file path=ppt/slides/slide14.xml><?xml version="1.0" encoding="utf-8"?>
+<file path=ppt/slides/slide18.xml><?xml version="1.0" encoding="utf-8"?>
 <p:sld xmlns:a="http://schemas.openxmlformats.org/drawingml/2006/main" xmlns:r="http://schemas.openxmlformats.org/officeDocument/2006/relationships" xmlns:p="http://schemas.openxmlformats.org/presentationml/2006/main">
   <p:cSld>
     <p:spTree>
@@ -4783,7 +5300,7 @@
       </p:sp>
       <p:pic>
         <p:nvPicPr>
-          <p:cNvPr id="5" name="Picture 4" descr="Screen Clipping"/>
+          <p:cNvPr id="6" name="Picture 5" descr="Screen Clipping"/>
           <p:cNvPicPr>
             <a:picLocks noChangeAspect="1"/>
           </p:cNvPicPr>
@@ -4803,8 +5320,8 @@
         </p:blipFill>
         <p:spPr>
           <a:xfrm>
-            <a:off x="0" y="685800"/>
-            <a:ext cx="9144000" cy="6172200"/>
+            <a:off x="0" y="838200"/>
+            <a:ext cx="9144000" cy="6019800"/>
           </a:xfrm>
           <a:prstGeom prst="rect">
             <a:avLst/>
@@ -4831,7 +5348,7 @@
 </p:sld>
 </file>
 
-<file path=ppt/slides/slide15.xml><?xml version="1.0" encoding="utf-8"?>
+<file path=ppt/slides/slide19.xml><?xml version="1.0" encoding="utf-8"?>
 <p:sld xmlns:a="http://schemas.openxmlformats.org/drawingml/2006/main" xmlns:r="http://schemas.openxmlformats.org/officeDocument/2006/relationships" xmlns:p="http://schemas.openxmlformats.org/presentationml/2006/main">
   <p:cSld>
     <p:spTree>
@@ -4955,7 +5472,281 @@
 </p:sld>
 </file>
 
-<file path=ppt/slides/slide16.xml><?xml version="1.0" encoding="utf-8"?>
+<file path=ppt/slides/slide2.xml><?xml version="1.0" encoding="utf-8"?>
+<p:sld xmlns:a="http://schemas.openxmlformats.org/drawingml/2006/main" xmlns:r="http://schemas.openxmlformats.org/officeDocument/2006/relationships" xmlns:p="http://schemas.openxmlformats.org/presentationml/2006/main">
+  <p:cSld>
+    <p:spTree>
+      <p:nvGrpSpPr>
+        <p:cNvPr id="1" name=""/>
+        <p:cNvGrpSpPr/>
+        <p:nvPr/>
+      </p:nvGrpSpPr>
+      <p:grpSpPr>
+        <a:xfrm>
+          <a:off x="0" y="0"/>
+          <a:ext cx="0" cy="0"/>
+          <a:chOff x="0" y="0"/>
+          <a:chExt cx="0" cy="0"/>
+        </a:xfrm>
+      </p:grpSpPr>
+      <p:sp>
+        <p:nvSpPr>
+          <p:cNvPr id="2" name="Text Placeholder 1"/>
+          <p:cNvSpPr>
+            <a:spLocks noGrp="1"/>
+          </p:cNvSpPr>
+          <p:nvPr>
+            <p:ph type="body" sz="quarter" idx="14"/>
+          </p:nvPr>
+        </p:nvSpPr>
+        <p:spPr/>
+        <p:txBody>
+          <a:bodyPr/>
+          <a:lstStyle/>
+          <a:p>
+            <a:endParaRPr lang="en-US"/>
+          </a:p>
+        </p:txBody>
+      </p:sp>
+      <p:sp>
+        <p:nvSpPr>
+          <p:cNvPr id="3" name="Text Placeholder 2"/>
+          <p:cNvSpPr>
+            <a:spLocks noGrp="1"/>
+          </p:cNvSpPr>
+          <p:nvPr>
+            <p:ph type="body" sz="quarter" idx="13"/>
+          </p:nvPr>
+        </p:nvSpPr>
+        <p:spPr/>
+        <p:txBody>
+          <a:bodyPr/>
+          <a:lstStyle/>
+          <a:p>
+            <a:endParaRPr lang="en-US"/>
+          </a:p>
+        </p:txBody>
+      </p:sp>
+      <p:sp>
+        <p:nvSpPr>
+          <p:cNvPr id="4" name="Slide Number Placeholder 3"/>
+          <p:cNvSpPr>
+            <a:spLocks noGrp="1"/>
+          </p:cNvSpPr>
+          <p:nvPr>
+            <p:ph type="sldNum" sz="quarter" idx="4"/>
+          </p:nvPr>
+        </p:nvSpPr>
+        <p:spPr/>
+        <p:txBody>
+          <a:bodyPr/>
+          <a:lstStyle/>
+          <a:p>
+            <a:fld id="{44043744-42FE-4892-90BA-7087481EB81E}" type="slidenum">
+              <a:rPr lang="de-DE" smtClean="0"/>
+              <a:pPr/>
+              <a:t>2</a:t>
+            </a:fld>
+            <a:endParaRPr lang="de-DE"/>
+          </a:p>
+        </p:txBody>
+      </p:sp>
+      <p:sp>
+        <p:nvSpPr>
+          <p:cNvPr id="5" name="Date Placeholder 4"/>
+          <p:cNvSpPr>
+            <a:spLocks noGrp="1"/>
+          </p:cNvSpPr>
+          <p:nvPr>
+            <p:ph type="dt" sz="half" idx="2"/>
+          </p:nvPr>
+        </p:nvSpPr>
+        <p:spPr/>
+        <p:txBody>
+          <a:bodyPr/>
+          <a:lstStyle/>
+          <a:p>
+            <a:fld id="{5F5C7AA8-AF19-4FCF-98FD-FB8AFEA87A63}" type="datetime4">
+              <a:rPr lang="en-US" smtClean="0"/>
+              <a:t>June 7, 2019</a:t>
+            </a:fld>
+            <a:endParaRPr lang="de-DE"/>
+          </a:p>
+        </p:txBody>
+      </p:sp>
+      <p:sp>
+        <p:nvSpPr>
+          <p:cNvPr id="6" name="Footer Placeholder 5"/>
+          <p:cNvSpPr>
+            <a:spLocks noGrp="1"/>
+          </p:cNvSpPr>
+          <p:nvPr>
+            <p:ph type="ftr" sz="quarter" idx="3"/>
+          </p:nvPr>
+        </p:nvSpPr>
+        <p:spPr/>
+        <p:txBody>
+          <a:bodyPr/>
+          <a:lstStyle/>
+          <a:p>
+            <a:endParaRPr lang="de-DE"/>
+          </a:p>
+        </p:txBody>
+      </p:sp>
+      <p:sp>
+        <p:nvSpPr>
+          <p:cNvPr id="7" name="Title 6"/>
+          <p:cNvSpPr>
+            <a:spLocks noGrp="1"/>
+          </p:cNvSpPr>
+          <p:nvPr>
+            <p:ph type="title"/>
+          </p:nvPr>
+        </p:nvSpPr>
+        <p:spPr>
+          <a:xfrm>
+            <a:off x="0" y="5407831"/>
+            <a:ext cx="6705600" cy="671292"/>
+          </a:xfrm>
+        </p:spPr>
+        <p:txBody>
+          <a:bodyPr/>
+          <a:lstStyle/>
+          <a:p>
+            <a:r>
+              <a:rPr lang="en-US" dirty="0" smtClean="0"/>
+              <a:t>Dashboard’s Powered </a:t>
+            </a:r>
+            <a:r>
+              <a:rPr lang="en-US" dirty="0"/>
+              <a:t>by </a:t>
+            </a:r>
+            <a:r>
+              <a:rPr lang="en-US" dirty="0" err="1"/>
+              <a:t>Plotly</a:t>
+            </a:r>
+            <a:r>
+              <a:rPr lang="en-US" dirty="0"/>
+              <a:t>, Python &amp; Panda</a:t>
+            </a:r>
+          </a:p>
+        </p:txBody>
+      </p:sp>
+      <p:pic>
+        <p:nvPicPr>
+          <p:cNvPr id="8" name="Picture 2" descr="Q:\CMM-Dept\Internal\20 Marketing 2020\M20-C -- Content\M20-C-0010 -- Trending topics\Digitization\Bild01_Blanko.jpg"/>
+          <p:cNvPicPr>
+            <a:picLocks noChangeAspect="1" noChangeArrowheads="1"/>
+          </p:cNvPicPr>
+          <p:nvPr/>
+        </p:nvPicPr>
+        <p:blipFill rotWithShape="1">
+          <a:blip r:embed="rId2">
+            <a:extLst>
+              <a:ext uri="{28A0092B-C50C-407E-A947-70E740481C1C}">
+                <a14:useLocalDpi xmlns:a14="http://schemas.microsoft.com/office/drawing/2010/main" val="0"/>
+              </a:ext>
+            </a:extLst>
+          </a:blip>
+          <a:srcRect r="796"/>
+          <a:stretch/>
+        </p:blipFill>
+        <p:spPr bwMode="auto">
+          <a:xfrm>
+            <a:off x="0" y="1089024"/>
+            <a:ext cx="9144000" cy="4321175"/>
+          </a:xfrm>
+          <a:prstGeom prst="rect">
+            <a:avLst/>
+          </a:prstGeom>
+          <a:noFill/>
+          <a:extLst>
+            <a:ext uri="{909E8E84-426E-40DD-AFC4-6F175D3DCCD1}">
+              <a14:hiddenFill xmlns:a14="http://schemas.microsoft.com/office/drawing/2010/main">
+                <a:solidFill>
+                  <a:srgbClr val="FFFFFF"/>
+                </a:solidFill>
+              </a14:hiddenFill>
+            </a:ext>
+          </a:extLst>
+        </p:spPr>
+      </p:pic>
+      <p:sp>
+        <p:nvSpPr>
+          <p:cNvPr id="9" name="Titel 6"/>
+          <p:cNvSpPr txBox="1">
+            <a:spLocks/>
+          </p:cNvSpPr>
+          <p:nvPr/>
+        </p:nvSpPr>
+        <p:spPr bwMode="auto">
+          <a:xfrm>
+            <a:off x="0" y="381000"/>
+            <a:ext cx="6840000" cy="702000"/>
+          </a:xfrm>
+          <a:prstGeom prst="rect">
+            <a:avLst/>
+          </a:prstGeom>
+          <a:solidFill>
+            <a:schemeClr val="accent5"/>
+          </a:solidFill>
+          <a:ln w="9525">
+            <a:noFill/>
+          </a:ln>
+        </p:spPr>
+        <p:txBody>
+          <a:bodyPr vert="horz" wrap="square" lIns="252000" tIns="180000" rIns="0" bIns="180000" rtlCol="0" anchor="b" anchorCtr="0">
+            <a:spAutoFit/>
+          </a:bodyPr>
+          <a:lstStyle>
+            <a:lvl1pPr algn="l" defTabSz="914400" rtl="0" eaLnBrk="1" latinLnBrk="0" hangingPunct="1">
+              <a:lnSpc>
+                <a:spcPct val="100000"/>
+              </a:lnSpc>
+              <a:spcBef>
+                <a:spcPct val="0"/>
+              </a:spcBef>
+              <a:buNone/>
+              <a:defRPr sz="2000" b="1" kern="1200" cap="none" baseline="0">
+                <a:solidFill>
+                  <a:schemeClr val="tx2"/>
+                </a:solidFill>
+                <a:latin typeface="+mj-lt"/>
+                <a:ea typeface="+mj-ea"/>
+                <a:cs typeface="+mj-cs"/>
+              </a:defRPr>
+            </a:lvl1pPr>
+          </a:lstStyle>
+          <a:p>
+            <a:r>
+              <a:rPr lang="de-DE" dirty="0" smtClean="0"/>
+              <a:t>Digitalization makes it possible to take different points of view</a:t>
+            </a:r>
+            <a:endParaRPr lang="en-US" dirty="0"/>
+          </a:p>
+        </p:txBody>
+      </p:sp>
+    </p:spTree>
+    <p:extLst>
+      <p:ext uri="{BB962C8B-B14F-4D97-AF65-F5344CB8AC3E}">
+        <p14:creationId xmlns:p14="http://schemas.microsoft.com/office/powerpoint/2010/main" val="2458481346"/>
+      </p:ext>
+    </p:extLst>
+  </p:cSld>
+  <p:clrMapOvr>
+    <a:masterClrMapping/>
+  </p:clrMapOvr>
+  <p:timing>
+    <p:tnLst>
+      <p:par>
+        <p:cTn id="1" dur="indefinite" restart="never" nodeType="tmRoot"/>
+      </p:par>
+    </p:tnLst>
+  </p:timing>
+</p:sld>
+</file>
+
+<file path=ppt/slides/slide20.xml><?xml version="1.0" encoding="utf-8"?>
 <p:sld xmlns:a="http://schemas.openxmlformats.org/drawingml/2006/main" xmlns:r="http://schemas.openxmlformats.org/officeDocument/2006/relationships" xmlns:p="http://schemas.openxmlformats.org/presentationml/2006/main">
   <p:cSld>
     <p:spTree>
@@ -5079,7 +5870,7 @@
 </p:sld>
 </file>
 
-<file path=ppt/slides/slide17.xml><?xml version="1.0" encoding="utf-8"?>
+<file path=ppt/slides/slide21.xml><?xml version="1.0" encoding="utf-8"?>
 <p:sld xmlns:a="http://schemas.openxmlformats.org/drawingml/2006/main" xmlns:r="http://schemas.openxmlformats.org/officeDocument/2006/relationships" xmlns:p="http://schemas.openxmlformats.org/presentationml/2006/main">
   <p:cSld>
     <p:spTree>
@@ -5227,7 +6018,7 @@
 </p:sld>
 </file>
 
-<file path=ppt/slides/slide18.xml><?xml version="1.0" encoding="utf-8"?>
+<file path=ppt/slides/slide22.xml><?xml version="1.0" encoding="utf-8"?>
 <p:sld xmlns:a="http://schemas.openxmlformats.org/drawingml/2006/main" xmlns:r="http://schemas.openxmlformats.org/officeDocument/2006/relationships" xmlns:p="http://schemas.openxmlformats.org/presentationml/2006/main">
   <p:cSld>
     <p:spTree>
@@ -5323,14 +6114,179 @@
         </p:blipFill>
         <p:spPr>
           <a:xfrm>
-            <a:off x="0" y="685800"/>
-            <a:ext cx="9144000" cy="6172200"/>
+            <a:off x="0" y="979069"/>
+            <a:ext cx="9144000" cy="5878931"/>
           </a:xfrm>
           <a:prstGeom prst="rect">
             <a:avLst/>
           </a:prstGeom>
         </p:spPr>
       </p:pic>
+      <p:sp>
+        <p:nvSpPr>
+          <p:cNvPr id="6" name="Title 3"/>
+          <p:cNvSpPr txBox="1">
+            <a:spLocks/>
+          </p:cNvSpPr>
+          <p:nvPr/>
+        </p:nvSpPr>
+        <p:spPr bwMode="auto">
+          <a:xfrm>
+            <a:off x="0" y="307777"/>
+            <a:ext cx="2971800" cy="671292"/>
+          </a:xfrm>
+          <a:prstGeom prst="rect">
+            <a:avLst/>
+          </a:prstGeom>
+          <a:solidFill>
+            <a:schemeClr val="accent5"/>
+          </a:solidFill>
+          <a:ln w="9525">
+            <a:noFill/>
+          </a:ln>
+        </p:spPr>
+        <p:txBody>
+          <a:bodyPr vert="horz" wrap="square" lIns="252000" tIns="180000" rIns="0" bIns="180000" rtlCol="0" anchor="b" anchorCtr="0">
+            <a:spAutoFit/>
+          </a:bodyPr>
+          <a:lstStyle>
+            <a:lvl1pPr algn="l" defTabSz="914400" rtl="0" eaLnBrk="1" latinLnBrk="0" hangingPunct="1">
+              <a:lnSpc>
+                <a:spcPct val="100000"/>
+              </a:lnSpc>
+              <a:spcBef>
+                <a:spcPct val="0"/>
+              </a:spcBef>
+              <a:buNone/>
+              <a:defRPr sz="2000" b="1" kern="1200" cap="none" baseline="0">
+                <a:solidFill>
+                  <a:schemeClr val="tx2"/>
+                </a:solidFill>
+                <a:latin typeface="+mj-lt"/>
+                <a:ea typeface="+mj-ea"/>
+                <a:cs typeface="+mj-cs"/>
+              </a:defRPr>
+            </a:lvl1pPr>
+          </a:lstStyle>
+          <a:p>
+            <a:r>
+              <a:rPr lang="en-US" dirty="0" smtClean="0"/>
+              <a:t>Flask Application</a:t>
+            </a:r>
+            <a:endParaRPr lang="en-US" dirty="0"/>
+          </a:p>
+        </p:txBody>
+      </p:sp>
+      <p:sp>
+        <p:nvSpPr>
+          <p:cNvPr id="7" name="Title 3"/>
+          <p:cNvSpPr txBox="1">
+            <a:spLocks/>
+          </p:cNvSpPr>
+          <p:nvPr/>
+        </p:nvSpPr>
+        <p:spPr bwMode="auto">
+          <a:xfrm>
+            <a:off x="2971800" y="307777"/>
+            <a:ext cx="2590800" cy="671292"/>
+          </a:xfrm>
+          <a:prstGeom prst="rect">
+            <a:avLst/>
+          </a:prstGeom>
+          <a:solidFill>
+            <a:schemeClr val="accent5"/>
+          </a:solidFill>
+          <a:ln w="9525">
+            <a:noFill/>
+          </a:ln>
+        </p:spPr>
+        <p:txBody>
+          <a:bodyPr vert="horz" wrap="square" lIns="252000" tIns="180000" rIns="0" bIns="180000" rtlCol="0" anchor="b" anchorCtr="0">
+            <a:spAutoFit/>
+          </a:bodyPr>
+          <a:lstStyle>
+            <a:lvl1pPr algn="l" defTabSz="914400" rtl="0" eaLnBrk="1" latinLnBrk="0" hangingPunct="1">
+              <a:lnSpc>
+                <a:spcPct val="100000"/>
+              </a:lnSpc>
+              <a:spcBef>
+                <a:spcPct val="0"/>
+              </a:spcBef>
+              <a:buNone/>
+              <a:defRPr sz="2000" b="1" kern="1200" cap="none" baseline="0">
+                <a:solidFill>
+                  <a:schemeClr val="tx2"/>
+                </a:solidFill>
+                <a:latin typeface="+mj-lt"/>
+                <a:ea typeface="+mj-ea"/>
+                <a:cs typeface="+mj-cs"/>
+              </a:defRPr>
+            </a:lvl1pPr>
+          </a:lstStyle>
+          <a:p>
+            <a:r>
+              <a:rPr lang="en-US" dirty="0" smtClean="0"/>
+              <a:t>Celery Worker</a:t>
+            </a:r>
+            <a:endParaRPr lang="en-US" dirty="0"/>
+          </a:p>
+        </p:txBody>
+      </p:sp>
+      <p:sp>
+        <p:nvSpPr>
+          <p:cNvPr id="8" name="Title 3"/>
+          <p:cNvSpPr txBox="1">
+            <a:spLocks/>
+          </p:cNvSpPr>
+          <p:nvPr/>
+        </p:nvSpPr>
+        <p:spPr bwMode="auto">
+          <a:xfrm>
+            <a:off x="5410200" y="307777"/>
+            <a:ext cx="1803779" cy="671292"/>
+          </a:xfrm>
+          <a:prstGeom prst="rect">
+            <a:avLst/>
+          </a:prstGeom>
+          <a:solidFill>
+            <a:schemeClr val="accent5"/>
+          </a:solidFill>
+          <a:ln w="9525">
+            <a:noFill/>
+          </a:ln>
+        </p:spPr>
+        <p:txBody>
+          <a:bodyPr vert="horz" wrap="square" lIns="252000" tIns="180000" rIns="0" bIns="180000" rtlCol="0" anchor="b" anchorCtr="0">
+            <a:spAutoFit/>
+          </a:bodyPr>
+          <a:lstStyle>
+            <a:lvl1pPr algn="l" defTabSz="914400" rtl="0" eaLnBrk="1" latinLnBrk="0" hangingPunct="1">
+              <a:lnSpc>
+                <a:spcPct val="100000"/>
+              </a:lnSpc>
+              <a:spcBef>
+                <a:spcPct val="0"/>
+              </a:spcBef>
+              <a:buNone/>
+              <a:defRPr sz="2000" b="1" kern="1200" cap="none" baseline="0">
+                <a:solidFill>
+                  <a:schemeClr val="tx2"/>
+                </a:solidFill>
+                <a:latin typeface="+mj-lt"/>
+                <a:ea typeface="+mj-ea"/>
+                <a:cs typeface="+mj-cs"/>
+              </a:defRPr>
+            </a:lvl1pPr>
+          </a:lstStyle>
+          <a:p>
+            <a:r>
+              <a:rPr lang="en-US" dirty="0" smtClean="0"/>
+              <a:t>Celery Beat</a:t>
+            </a:r>
+            <a:endParaRPr lang="en-US" dirty="0"/>
+          </a:p>
+        </p:txBody>
+      </p:sp>
     </p:spTree>
     <p:extLst>
       <p:ext uri="{BB962C8B-B14F-4D97-AF65-F5344CB8AC3E}">
@@ -5351,7 +6307,270 @@
 </p:sld>
 </file>
 
-<file path=ppt/slides/slide19.xml><?xml version="1.0" encoding="utf-8"?>
+<file path=ppt/slides/slide23.xml><?xml version="1.0" encoding="utf-8"?>
+<p:sld xmlns:a="http://schemas.openxmlformats.org/drawingml/2006/main" xmlns:r="http://schemas.openxmlformats.org/officeDocument/2006/relationships" xmlns:p="http://schemas.openxmlformats.org/presentationml/2006/main">
+  <p:cSld>
+    <p:spTree>
+      <p:nvGrpSpPr>
+        <p:cNvPr id="1" name=""/>
+        <p:cNvGrpSpPr/>
+        <p:nvPr/>
+      </p:nvGrpSpPr>
+      <p:grpSpPr>
+        <a:xfrm>
+          <a:off x="0" y="0"/>
+          <a:ext cx="0" cy="0"/>
+          <a:chOff x="0" y="0"/>
+          <a:chExt cx="0" cy="0"/>
+        </a:xfrm>
+      </p:grpSpPr>
+      <p:sp>
+        <p:nvSpPr>
+          <p:cNvPr id="2" name="Text Placeholder 1"/>
+          <p:cNvSpPr>
+            <a:spLocks noGrp="1"/>
+          </p:cNvSpPr>
+          <p:nvPr>
+            <p:ph type="body" sz="quarter" idx="14"/>
+          </p:nvPr>
+        </p:nvSpPr>
+        <p:spPr/>
+        <p:txBody>
+          <a:bodyPr/>
+          <a:lstStyle/>
+          <a:p>
+            <a:endParaRPr lang="en-US"/>
+          </a:p>
+        </p:txBody>
+      </p:sp>
+      <p:sp>
+        <p:nvSpPr>
+          <p:cNvPr id="3" name="Text Placeholder 2"/>
+          <p:cNvSpPr>
+            <a:spLocks noGrp="1"/>
+          </p:cNvSpPr>
+          <p:nvPr>
+            <p:ph type="body" sz="quarter" idx="13"/>
+          </p:nvPr>
+        </p:nvSpPr>
+        <p:spPr/>
+        <p:txBody>
+          <a:bodyPr/>
+          <a:lstStyle/>
+          <a:p>
+            <a:endParaRPr lang="en-US"/>
+          </a:p>
+        </p:txBody>
+      </p:sp>
+      <p:sp>
+        <p:nvSpPr>
+          <p:cNvPr id="4" name="Title 3"/>
+          <p:cNvSpPr>
+            <a:spLocks noGrp="1"/>
+          </p:cNvSpPr>
+          <p:nvPr>
+            <p:ph type="title"/>
+          </p:nvPr>
+        </p:nvSpPr>
+        <p:spPr>
+          <a:xfrm>
+            <a:off x="25021" y="90708"/>
+            <a:ext cx="5940000" cy="671292"/>
+          </a:xfrm>
+        </p:spPr>
+        <p:txBody>
+          <a:bodyPr/>
+          <a:lstStyle/>
+          <a:p>
+            <a:r>
+              <a:rPr lang="en-US" dirty="0" smtClean="0"/>
+              <a:t>Software Requirements</a:t>
+            </a:r>
+            <a:endParaRPr lang="en-US" dirty="0"/>
+          </a:p>
+        </p:txBody>
+      </p:sp>
+      <p:sp>
+        <p:nvSpPr>
+          <p:cNvPr id="5" name="Rectangle 4"/>
+          <p:cNvSpPr/>
+          <p:nvPr/>
+        </p:nvSpPr>
+        <p:spPr>
+          <a:xfrm>
+            <a:off x="25021" y="762000"/>
+            <a:ext cx="4572000" cy="5078313"/>
+          </a:xfrm>
+          <a:prstGeom prst="rect">
+            <a:avLst/>
+          </a:prstGeom>
+        </p:spPr>
+        <p:txBody>
+          <a:bodyPr>
+            <a:spAutoFit/>
+          </a:bodyPr>
+          <a:lstStyle/>
+          <a:p>
+            <a:r>
+              <a:rPr lang="en-US" dirty="0"/>
+              <a:t>celery==4.3.0</a:t>
+            </a:r>
+          </a:p>
+          <a:p>
+            <a:r>
+              <a:rPr lang="en-US" dirty="0"/>
+              <a:t>dash==0.40.0</a:t>
+            </a:r>
+          </a:p>
+          <a:p>
+            <a:r>
+              <a:rPr lang="en-US" dirty="0"/>
+              <a:t>dash-core-components==0.45.0</a:t>
+            </a:r>
+          </a:p>
+          <a:p>
+            <a:r>
+              <a:rPr lang="en-US" dirty="0"/>
+              <a:t>dash-html-components==0.15.0</a:t>
+            </a:r>
+          </a:p>
+          <a:p>
+            <a:r>
+              <a:rPr lang="en-US" dirty="0"/>
+              <a:t>dash-table==3.6.0</a:t>
+            </a:r>
+          </a:p>
+          <a:p>
+            <a:r>
+              <a:rPr lang="en-US" dirty="0"/>
+              <a:t>Flask==1.0.2</a:t>
+            </a:r>
+          </a:p>
+          <a:p>
+            <a:r>
+              <a:rPr lang="en-US" dirty="0"/>
+              <a:t>Flask-Cache==0.13.1</a:t>
+            </a:r>
+          </a:p>
+          <a:p>
+            <a:r>
+              <a:rPr lang="en-US" dirty="0"/>
+              <a:t>Flask-Caching==1.7.0</a:t>
+            </a:r>
+          </a:p>
+          <a:p>
+            <a:r>
+              <a:rPr lang="en-US" dirty="0"/>
+              <a:t>Flask-Compress==1.4.0</a:t>
+            </a:r>
+          </a:p>
+          <a:p>
+            <a:r>
+              <a:rPr lang="en-US" dirty="0"/>
+              <a:t>Flask-</a:t>
+            </a:r>
+            <a:r>
+              <a:rPr lang="en-US" dirty="0" err="1"/>
+              <a:t>Cors</a:t>
+            </a:r>
+            <a:r>
+              <a:rPr lang="en-US" dirty="0"/>
+              <a:t>==3.0.7</a:t>
+            </a:r>
+          </a:p>
+          <a:p>
+            <a:r>
+              <a:rPr lang="en-US" dirty="0"/>
+              <a:t>Jinja2==2.10</a:t>
+            </a:r>
+          </a:p>
+          <a:p>
+            <a:r>
+              <a:rPr lang="en-US" dirty="0" err="1"/>
+              <a:t>jsonschema</a:t>
+            </a:r>
+            <a:r>
+              <a:rPr lang="en-US" dirty="0"/>
+              <a:t>==2.6.0</a:t>
+            </a:r>
+          </a:p>
+          <a:p>
+            <a:r>
+              <a:rPr lang="en-US" dirty="0" err="1"/>
+              <a:t>numpy</a:t>
+            </a:r>
+            <a:r>
+              <a:rPr lang="en-US" dirty="0"/>
+              <a:t>==1.15.4</a:t>
+            </a:r>
+          </a:p>
+          <a:p>
+            <a:r>
+              <a:rPr lang="en-US" dirty="0"/>
+              <a:t>pandas==0.23.4</a:t>
+            </a:r>
+          </a:p>
+          <a:p>
+            <a:r>
+              <a:rPr lang="en-US" dirty="0" err="1"/>
+              <a:t>plotly</a:t>
+            </a:r>
+            <a:r>
+              <a:rPr lang="en-US" dirty="0"/>
+              <a:t>==3.7.1</a:t>
+            </a:r>
+          </a:p>
+          <a:p>
+            <a:r>
+              <a:rPr lang="en-US" dirty="0" err="1"/>
+              <a:t>redis</a:t>
+            </a:r>
+            <a:r>
+              <a:rPr lang="en-US" dirty="0"/>
+              <a:t>==</a:t>
+            </a:r>
+            <a:r>
+              <a:rPr lang="en-US" dirty="0" smtClean="0"/>
+              <a:t>3.2.1</a:t>
+            </a:r>
+          </a:p>
+          <a:p>
+            <a:endParaRPr lang="en-US" dirty="0"/>
+          </a:p>
+          <a:p>
+            <a:r>
+              <a:rPr lang="en-US" dirty="0" err="1" smtClean="0"/>
+              <a:t>redis</a:t>
+            </a:r>
+            <a:r>
+              <a:rPr lang="en-US" dirty="0" smtClean="0"/>
+              <a:t> server</a:t>
+            </a:r>
+            <a:endParaRPr lang="en-US" dirty="0"/>
+          </a:p>
+        </p:txBody>
+      </p:sp>
+    </p:spTree>
+    <p:extLst>
+      <p:ext uri="{BB962C8B-B14F-4D97-AF65-F5344CB8AC3E}">
+        <p14:creationId xmlns:p14="http://schemas.microsoft.com/office/powerpoint/2010/main" val="2227003504"/>
+      </p:ext>
+    </p:extLst>
+  </p:cSld>
+  <p:clrMapOvr>
+    <a:masterClrMapping/>
+  </p:clrMapOvr>
+  <p:timing>
+    <p:tnLst>
+      <p:par>
+        <p:cTn id="1" dur="indefinite" restart="never" nodeType="tmRoot"/>
+      </p:par>
+    </p:tnLst>
+  </p:timing>
+</p:sld>
+</file>
+
+<file path=ppt/slides/slide24.xml><?xml version="1.0" encoding="utf-8"?>
 <p:sld xmlns:a="http://schemas.openxmlformats.org/drawingml/2006/main" xmlns:r="http://schemas.openxmlformats.org/officeDocument/2006/relationships" xmlns:p="http://schemas.openxmlformats.org/presentationml/2006/main">
   <p:cSld>
     <p:spTree>
@@ -5475,280 +6694,6 @@
 </p:sld>
 </file>
 
-<file path=ppt/slides/slide2.xml><?xml version="1.0" encoding="utf-8"?>
-<p:sld xmlns:a="http://schemas.openxmlformats.org/drawingml/2006/main" xmlns:r="http://schemas.openxmlformats.org/officeDocument/2006/relationships" xmlns:p="http://schemas.openxmlformats.org/presentationml/2006/main">
-  <p:cSld>
-    <p:spTree>
-      <p:nvGrpSpPr>
-        <p:cNvPr id="1" name=""/>
-        <p:cNvGrpSpPr/>
-        <p:nvPr/>
-      </p:nvGrpSpPr>
-      <p:grpSpPr>
-        <a:xfrm>
-          <a:off x="0" y="0"/>
-          <a:ext cx="0" cy="0"/>
-          <a:chOff x="0" y="0"/>
-          <a:chExt cx="0" cy="0"/>
-        </a:xfrm>
-      </p:grpSpPr>
-      <p:sp>
-        <p:nvSpPr>
-          <p:cNvPr id="2" name="Text Placeholder 1"/>
-          <p:cNvSpPr>
-            <a:spLocks noGrp="1"/>
-          </p:cNvSpPr>
-          <p:nvPr>
-            <p:ph type="body" sz="quarter" idx="14"/>
-          </p:nvPr>
-        </p:nvSpPr>
-        <p:spPr/>
-        <p:txBody>
-          <a:bodyPr/>
-          <a:lstStyle/>
-          <a:p>
-            <a:endParaRPr lang="en-US"/>
-          </a:p>
-        </p:txBody>
-      </p:sp>
-      <p:sp>
-        <p:nvSpPr>
-          <p:cNvPr id="3" name="Text Placeholder 2"/>
-          <p:cNvSpPr>
-            <a:spLocks noGrp="1"/>
-          </p:cNvSpPr>
-          <p:nvPr>
-            <p:ph type="body" sz="quarter" idx="13"/>
-          </p:nvPr>
-        </p:nvSpPr>
-        <p:spPr/>
-        <p:txBody>
-          <a:bodyPr/>
-          <a:lstStyle/>
-          <a:p>
-            <a:endParaRPr lang="en-US"/>
-          </a:p>
-        </p:txBody>
-      </p:sp>
-      <p:sp>
-        <p:nvSpPr>
-          <p:cNvPr id="4" name="Slide Number Placeholder 3"/>
-          <p:cNvSpPr>
-            <a:spLocks noGrp="1"/>
-          </p:cNvSpPr>
-          <p:nvPr>
-            <p:ph type="sldNum" sz="quarter" idx="4"/>
-          </p:nvPr>
-        </p:nvSpPr>
-        <p:spPr/>
-        <p:txBody>
-          <a:bodyPr/>
-          <a:lstStyle/>
-          <a:p>
-            <a:fld id="{44043744-42FE-4892-90BA-7087481EB81E}" type="slidenum">
-              <a:rPr lang="de-DE" smtClean="0"/>
-              <a:pPr/>
-              <a:t>2</a:t>
-            </a:fld>
-            <a:endParaRPr lang="de-DE"/>
-          </a:p>
-        </p:txBody>
-      </p:sp>
-      <p:sp>
-        <p:nvSpPr>
-          <p:cNvPr id="5" name="Date Placeholder 4"/>
-          <p:cNvSpPr>
-            <a:spLocks noGrp="1"/>
-          </p:cNvSpPr>
-          <p:nvPr>
-            <p:ph type="dt" sz="half" idx="2"/>
-          </p:nvPr>
-        </p:nvSpPr>
-        <p:spPr/>
-        <p:txBody>
-          <a:bodyPr/>
-          <a:lstStyle/>
-          <a:p>
-            <a:fld id="{5F5C7AA8-AF19-4FCF-98FD-FB8AFEA87A63}" type="datetime4">
-              <a:rPr lang="en-US" smtClean="0"/>
-              <a:t>May 20, 2019</a:t>
-            </a:fld>
-            <a:endParaRPr lang="de-DE"/>
-          </a:p>
-        </p:txBody>
-      </p:sp>
-      <p:sp>
-        <p:nvSpPr>
-          <p:cNvPr id="6" name="Footer Placeholder 5"/>
-          <p:cNvSpPr>
-            <a:spLocks noGrp="1"/>
-          </p:cNvSpPr>
-          <p:nvPr>
-            <p:ph type="ftr" sz="quarter" idx="3"/>
-          </p:nvPr>
-        </p:nvSpPr>
-        <p:spPr/>
-        <p:txBody>
-          <a:bodyPr/>
-          <a:lstStyle/>
-          <a:p>
-            <a:endParaRPr lang="de-DE"/>
-          </a:p>
-        </p:txBody>
-      </p:sp>
-      <p:sp>
-        <p:nvSpPr>
-          <p:cNvPr id="7" name="Title 6"/>
-          <p:cNvSpPr>
-            <a:spLocks noGrp="1"/>
-          </p:cNvSpPr>
-          <p:nvPr>
-            <p:ph type="title"/>
-          </p:nvPr>
-        </p:nvSpPr>
-        <p:spPr>
-          <a:xfrm>
-            <a:off x="0" y="5407831"/>
-            <a:ext cx="6705600" cy="671292"/>
-          </a:xfrm>
-        </p:spPr>
-        <p:txBody>
-          <a:bodyPr/>
-          <a:lstStyle/>
-          <a:p>
-            <a:r>
-              <a:rPr lang="en-US" dirty="0" smtClean="0"/>
-              <a:t>Dashboard’s Powered </a:t>
-            </a:r>
-            <a:r>
-              <a:rPr lang="en-US" dirty="0"/>
-              <a:t>by </a:t>
-            </a:r>
-            <a:r>
-              <a:rPr lang="en-US" dirty="0" err="1"/>
-              <a:t>Plotly</a:t>
-            </a:r>
-            <a:r>
-              <a:rPr lang="en-US" dirty="0"/>
-              <a:t>, Python &amp; Panda</a:t>
-            </a:r>
-          </a:p>
-        </p:txBody>
-      </p:sp>
-      <p:pic>
-        <p:nvPicPr>
-          <p:cNvPr id="8" name="Picture 2" descr="Q:\CMM-Dept\Internal\20 Marketing 2020\M20-C -- Content\M20-C-0010 -- Trending topics\Digitization\Bild01_Blanko.jpg"/>
-          <p:cNvPicPr>
-            <a:picLocks noChangeAspect="1" noChangeArrowheads="1"/>
-          </p:cNvPicPr>
-          <p:nvPr/>
-        </p:nvPicPr>
-        <p:blipFill rotWithShape="1">
-          <a:blip r:embed="rId2">
-            <a:extLst>
-              <a:ext uri="{28A0092B-C50C-407E-A947-70E740481C1C}">
-                <a14:useLocalDpi xmlns:a14="http://schemas.microsoft.com/office/drawing/2010/main" val="0"/>
-              </a:ext>
-            </a:extLst>
-          </a:blip>
-          <a:srcRect r="796"/>
-          <a:stretch/>
-        </p:blipFill>
-        <p:spPr bwMode="auto">
-          <a:xfrm>
-            <a:off x="0" y="1089024"/>
-            <a:ext cx="9144000" cy="4321175"/>
-          </a:xfrm>
-          <a:prstGeom prst="rect">
-            <a:avLst/>
-          </a:prstGeom>
-          <a:noFill/>
-          <a:extLst>
-            <a:ext uri="{909E8E84-426E-40DD-AFC4-6F175D3DCCD1}">
-              <a14:hiddenFill xmlns:a14="http://schemas.microsoft.com/office/drawing/2010/main">
-                <a:solidFill>
-                  <a:srgbClr val="FFFFFF"/>
-                </a:solidFill>
-              </a14:hiddenFill>
-            </a:ext>
-          </a:extLst>
-        </p:spPr>
-      </p:pic>
-      <p:sp>
-        <p:nvSpPr>
-          <p:cNvPr id="9" name="Titel 6"/>
-          <p:cNvSpPr txBox="1">
-            <a:spLocks/>
-          </p:cNvSpPr>
-          <p:nvPr/>
-        </p:nvSpPr>
-        <p:spPr bwMode="auto">
-          <a:xfrm>
-            <a:off x="0" y="381000"/>
-            <a:ext cx="6840000" cy="702000"/>
-          </a:xfrm>
-          <a:prstGeom prst="rect">
-            <a:avLst/>
-          </a:prstGeom>
-          <a:solidFill>
-            <a:schemeClr val="accent5"/>
-          </a:solidFill>
-          <a:ln w="9525">
-            <a:noFill/>
-          </a:ln>
-        </p:spPr>
-        <p:txBody>
-          <a:bodyPr vert="horz" wrap="square" lIns="252000" tIns="180000" rIns="0" bIns="180000" rtlCol="0" anchor="b" anchorCtr="0">
-            <a:spAutoFit/>
-          </a:bodyPr>
-          <a:lstStyle>
-            <a:lvl1pPr algn="l" defTabSz="914400" rtl="0" eaLnBrk="1" latinLnBrk="0" hangingPunct="1">
-              <a:lnSpc>
-                <a:spcPct val="100000"/>
-              </a:lnSpc>
-              <a:spcBef>
-                <a:spcPct val="0"/>
-              </a:spcBef>
-              <a:buNone/>
-              <a:defRPr sz="2000" b="1" kern="1200" cap="none" baseline="0">
-                <a:solidFill>
-                  <a:schemeClr val="tx2"/>
-                </a:solidFill>
-                <a:latin typeface="+mj-lt"/>
-                <a:ea typeface="+mj-ea"/>
-                <a:cs typeface="+mj-cs"/>
-              </a:defRPr>
-            </a:lvl1pPr>
-          </a:lstStyle>
-          <a:p>
-            <a:r>
-              <a:rPr lang="de-DE" dirty="0" smtClean="0"/>
-              <a:t>Digitalization makes it possible to take different points of view</a:t>
-            </a:r>
-            <a:endParaRPr lang="en-US" dirty="0"/>
-          </a:p>
-        </p:txBody>
-      </p:sp>
-    </p:spTree>
-    <p:extLst>
-      <p:ext uri="{BB962C8B-B14F-4D97-AF65-F5344CB8AC3E}">
-        <p14:creationId xmlns:p14="http://schemas.microsoft.com/office/powerpoint/2010/main" val="2458481346"/>
-      </p:ext>
-    </p:extLst>
-  </p:cSld>
-  <p:clrMapOvr>
-    <a:masterClrMapping/>
-  </p:clrMapOvr>
-  <p:timing>
-    <p:tnLst>
-      <p:par>
-        <p:cTn id="1" dur="indefinite" restart="never" nodeType="tmRoot"/>
-      </p:par>
-    </p:tnLst>
-  </p:timing>
-</p:sld>
-</file>
-
 <file path=ppt/slides/slide3.xml><?xml version="1.0" encoding="utf-8"?>
 <p:sld xmlns:a="http://schemas.openxmlformats.org/drawingml/2006/main" xmlns:r="http://schemas.openxmlformats.org/officeDocument/2006/relationships" xmlns:p="http://schemas.openxmlformats.org/presentationml/2006/main">
   <p:cSld>
@@ -5827,8 +6772,12 @@
           <a:lstStyle/>
           <a:p>
             <a:r>
+              <a:rPr lang="en-US" b="1" dirty="0" err="1"/>
+              <a:t>P</a:t>
+            </a:r>
+            <a:r>
               <a:rPr lang="en-US" b="1" dirty="0" err="1" smtClean="0"/>
-              <a:t>plotly</a:t>
+              <a:t>lotly</a:t>
             </a:r>
             <a:r>
               <a:rPr lang="en-US" b="1" dirty="0" smtClean="0"/>
@@ -5920,7 +6869,7 @@
         <p:spPr>
           <a:xfrm>
             <a:off x="228600" y="4114800"/>
-            <a:ext cx="7772400" cy="369332"/>
+            <a:ext cx="8077200" cy="923330"/>
           </a:xfrm>
           <a:prstGeom prst="rect">
             <a:avLst/>
@@ -5934,8 +6883,84 @@
           <a:lstStyle/>
           <a:p>
             <a:r>
+              <a:rPr lang="en-US" b="1" dirty="0"/>
+              <a:t>pandas</a:t>
+            </a:r>
+            <a:r>
+              <a:rPr lang="en-US" dirty="0"/>
+              <a:t> is a </a:t>
+            </a:r>
+            <a:r>
+              <a:rPr lang="en-US" dirty="0">
+                <a:hlinkClick r:id="rId2"/>
+              </a:rPr>
+              <a:t>Python</a:t>
+            </a:r>
+            <a:r>
+              <a:rPr lang="en-US" dirty="0"/>
+              <a:t> </a:t>
+            </a:r>
+            <a:r>
               <a:rPr lang="en-US" dirty="0" smtClean="0"/>
-              <a:t>Both projects are open source and license under MIT and BSD3 respectively. </a:t>
+              <a:t>package </a:t>
+            </a:r>
+            <a:r>
+              <a:rPr lang="en-US" dirty="0"/>
+              <a:t>License </a:t>
+            </a:r>
+            <a:r>
+              <a:rPr lang="en-US" dirty="0" smtClean="0"/>
+              <a:t> under BSD 3-Clause. </a:t>
+            </a:r>
+            <a:r>
+              <a:rPr lang="en-US" dirty="0">
+                <a:hlinkClick r:id="rId3"/>
+              </a:rPr>
+              <a:t>http://pandas.pydata.org/pandas-docs/stable/getting_started/overview.html#license</a:t>
+            </a:r>
+            <a:endParaRPr lang="en-US" dirty="0"/>
+          </a:p>
+        </p:txBody>
+      </p:sp>
+      <p:sp>
+        <p:nvSpPr>
+          <p:cNvPr id="8" name="TextBox 7"/>
+          <p:cNvSpPr txBox="1"/>
+          <p:nvPr/>
+        </p:nvSpPr>
+        <p:spPr>
+          <a:xfrm>
+            <a:off x="388961" y="5233579"/>
+            <a:ext cx="8077200" cy="646331"/>
+          </a:xfrm>
+          <a:prstGeom prst="rect">
+            <a:avLst/>
+          </a:prstGeom>
+          <a:noFill/>
+        </p:spPr>
+        <p:txBody>
+          <a:bodyPr wrap="square" rtlCol="0">
+            <a:spAutoFit/>
+          </a:bodyPr>
+          <a:lstStyle/>
+          <a:p>
+            <a:r>
+              <a:rPr lang="en-US" b="1" dirty="0" err="1"/>
+              <a:t>Plotly</a:t>
+            </a:r>
+            <a:r>
+              <a:rPr lang="en-US" b="1" dirty="0"/>
+              <a:t> | </a:t>
+            </a:r>
+            <a:r>
+              <a:rPr lang="en-US" b="1" dirty="0" smtClean="0"/>
+              <a:t>Dash is License under MIT. </a:t>
+            </a:r>
+            <a:r>
+              <a:rPr lang="en-US" dirty="0">
+                <a:hlinkClick r:id="rId4"/>
+              </a:rPr>
+              <a:t>https://github.com/plotly/dash/blob/master/LICENSE</a:t>
             </a:r>
             <a:endParaRPr lang="en-US" dirty="0"/>
           </a:p>
@@ -5962,6 +6987,2465 @@
 </file>
 
 <file path=ppt/slides/slide4.xml><?xml version="1.0" encoding="utf-8"?>
+<p:sld xmlns:a="http://schemas.openxmlformats.org/drawingml/2006/main" xmlns:r="http://schemas.openxmlformats.org/officeDocument/2006/relationships" xmlns:p="http://schemas.openxmlformats.org/presentationml/2006/main">
+  <p:cSld>
+    <p:spTree>
+      <p:nvGrpSpPr>
+        <p:cNvPr id="1" name=""/>
+        <p:cNvGrpSpPr/>
+        <p:nvPr/>
+      </p:nvGrpSpPr>
+      <p:grpSpPr>
+        <a:xfrm>
+          <a:off x="0" y="0"/>
+          <a:ext cx="0" cy="0"/>
+          <a:chOff x="0" y="0"/>
+          <a:chExt cx="0" cy="0"/>
+        </a:xfrm>
+      </p:grpSpPr>
+      <p:sp>
+        <p:nvSpPr>
+          <p:cNvPr id="2" name="Text Placeholder 1"/>
+          <p:cNvSpPr>
+            <a:spLocks noGrp="1"/>
+          </p:cNvSpPr>
+          <p:nvPr>
+            <p:ph type="body" sz="quarter" idx="14"/>
+          </p:nvPr>
+        </p:nvSpPr>
+        <p:spPr/>
+        <p:txBody>
+          <a:bodyPr/>
+          <a:lstStyle/>
+          <a:p>
+            <a:endParaRPr lang="en-US"/>
+          </a:p>
+        </p:txBody>
+      </p:sp>
+      <p:sp>
+        <p:nvSpPr>
+          <p:cNvPr id="3" name="Text Placeholder 2"/>
+          <p:cNvSpPr>
+            <a:spLocks noGrp="1"/>
+          </p:cNvSpPr>
+          <p:nvPr>
+            <p:ph type="body" sz="quarter" idx="13"/>
+          </p:nvPr>
+        </p:nvSpPr>
+        <p:spPr/>
+        <p:txBody>
+          <a:bodyPr/>
+          <a:lstStyle/>
+          <a:p>
+            <a:endParaRPr lang="en-US"/>
+          </a:p>
+        </p:txBody>
+      </p:sp>
+      <p:sp>
+        <p:nvSpPr>
+          <p:cNvPr id="5" name="TextBox 4"/>
+          <p:cNvSpPr txBox="1"/>
+          <p:nvPr/>
+        </p:nvSpPr>
+        <p:spPr>
+          <a:xfrm>
+            <a:off x="228600" y="990600"/>
+            <a:ext cx="8686800" cy="923330"/>
+          </a:xfrm>
+          <a:prstGeom prst="rect">
+            <a:avLst/>
+          </a:prstGeom>
+          <a:noFill/>
+        </p:spPr>
+        <p:txBody>
+          <a:bodyPr wrap="square" rtlCol="0">
+            <a:spAutoFit/>
+          </a:bodyPr>
+          <a:lstStyle/>
+          <a:p>
+            <a:r>
+              <a:rPr lang="en-US" b="1" dirty="0" err="1" smtClean="0"/>
+              <a:t>NumPy</a:t>
+            </a:r>
+            <a:r>
+              <a:rPr lang="en-US" b="1" dirty="0" smtClean="0"/>
+              <a:t>: -</a:t>
+            </a:r>
+            <a:r>
+              <a:rPr lang="en-US" dirty="0" err="1"/>
+              <a:t>NumPy</a:t>
+            </a:r>
+            <a:r>
+              <a:rPr lang="en-US" dirty="0"/>
+              <a:t> is a library for the Python programming language, adding support for large, multi-dimensional arrays and matrices, along with a large collection of high-level mathematical functions to operate on these arrays. </a:t>
+            </a:r>
+          </a:p>
+        </p:txBody>
+      </p:sp>
+      <p:sp>
+        <p:nvSpPr>
+          <p:cNvPr id="6" name="TextBox 5"/>
+          <p:cNvSpPr txBox="1"/>
+          <p:nvPr/>
+        </p:nvSpPr>
+        <p:spPr>
+          <a:xfrm>
+            <a:off x="228600" y="2057400"/>
+            <a:ext cx="8534400" cy="1754326"/>
+          </a:xfrm>
+          <a:prstGeom prst="rect">
+            <a:avLst/>
+          </a:prstGeom>
+          <a:noFill/>
+        </p:spPr>
+        <p:txBody>
+          <a:bodyPr wrap="square" rtlCol="0">
+            <a:spAutoFit/>
+          </a:bodyPr>
+          <a:lstStyle/>
+          <a:p>
+            <a:pPr fontAlgn="base"/>
+            <a:r>
+              <a:rPr lang="en-US" b="1" dirty="0"/>
+              <a:t>Celery: Distributed Task Queue</a:t>
+            </a:r>
+          </a:p>
+          <a:p>
+            <a:pPr fontAlgn="base"/>
+            <a:r>
+              <a:rPr lang="en-US" dirty="0" smtClean="0"/>
+              <a:t>Celery </a:t>
+            </a:r>
+            <a:r>
+              <a:rPr lang="en-US" dirty="0"/>
+              <a:t>is an asynchronous task queue/job queue based on distributed message passing. It is focused on real-time operation, but supports scheduling as well.</a:t>
+            </a:r>
+          </a:p>
+          <a:p>
+            <a:pPr fontAlgn="base"/>
+            <a:r>
+              <a:rPr lang="en-US" dirty="0"/>
+              <a:t>The execution units, called tasks, are executed concurrently on a single or more worker servers using multiprocessing, </a:t>
+            </a:r>
+            <a:r>
+              <a:rPr lang="en-US" dirty="0" err="1">
+                <a:hlinkClick r:id="rId2"/>
+              </a:rPr>
+              <a:t>Eventlet</a:t>
+            </a:r>
+            <a:r>
+              <a:rPr lang="en-US" dirty="0"/>
+              <a:t>, or </a:t>
+            </a:r>
+            <a:r>
+              <a:rPr lang="en-US" dirty="0" err="1">
+                <a:hlinkClick r:id="rId3"/>
+              </a:rPr>
+              <a:t>gevent</a:t>
+            </a:r>
+            <a:r>
+              <a:rPr lang="en-US" dirty="0"/>
+              <a:t>. Tasks can execute asynchronously (in the background) or synchronously (wait until ready).</a:t>
+            </a:r>
+          </a:p>
+        </p:txBody>
+      </p:sp>
+      <p:sp>
+        <p:nvSpPr>
+          <p:cNvPr id="7" name="TextBox 6"/>
+          <p:cNvSpPr txBox="1"/>
+          <p:nvPr/>
+        </p:nvSpPr>
+        <p:spPr>
+          <a:xfrm>
+            <a:off x="228600" y="4114800"/>
+            <a:ext cx="7772400" cy="646331"/>
+          </a:xfrm>
+          <a:prstGeom prst="rect">
+            <a:avLst/>
+          </a:prstGeom>
+          <a:noFill/>
+        </p:spPr>
+        <p:txBody>
+          <a:bodyPr wrap="square" rtlCol="0">
+            <a:spAutoFit/>
+          </a:bodyPr>
+          <a:lstStyle/>
+          <a:p>
+            <a:r>
+              <a:rPr lang="en-US" dirty="0"/>
+              <a:t>Celery is licensed under The BSD License (3 </a:t>
+            </a:r>
+            <a:r>
+              <a:rPr lang="en-US" dirty="0" smtClean="0"/>
+              <a:t>Clause). </a:t>
+            </a:r>
+            <a:r>
+              <a:rPr lang="en-US" dirty="0">
+                <a:hlinkClick r:id="rId4"/>
+              </a:rPr>
+              <a:t>https://github.com/celery/celery/blob/master/LICENSE</a:t>
+            </a:r>
+            <a:endParaRPr lang="en-US" dirty="0"/>
+          </a:p>
+        </p:txBody>
+      </p:sp>
+      <p:sp>
+        <p:nvSpPr>
+          <p:cNvPr id="9" name="TextBox 8"/>
+          <p:cNvSpPr txBox="1"/>
+          <p:nvPr/>
+        </p:nvSpPr>
+        <p:spPr>
+          <a:xfrm>
+            <a:off x="304800" y="4840069"/>
+            <a:ext cx="7772400" cy="646331"/>
+          </a:xfrm>
+          <a:prstGeom prst="rect">
+            <a:avLst/>
+          </a:prstGeom>
+          <a:noFill/>
+        </p:spPr>
+        <p:txBody>
+          <a:bodyPr wrap="square" rtlCol="0">
+            <a:spAutoFit/>
+          </a:bodyPr>
+          <a:lstStyle/>
+          <a:p>
+            <a:r>
+              <a:rPr lang="en-US" dirty="0" err="1"/>
+              <a:t>NumPy</a:t>
+            </a:r>
+            <a:r>
+              <a:rPr lang="en-US" dirty="0"/>
+              <a:t> is licensed under the </a:t>
+            </a:r>
+            <a:r>
+              <a:rPr lang="en-US" dirty="0">
+                <a:hlinkClick r:id="rId5"/>
+              </a:rPr>
+              <a:t>BSD license</a:t>
+            </a:r>
+            <a:r>
+              <a:rPr lang="en-US" dirty="0"/>
+              <a:t>, enabling reuse with few restrictions</a:t>
+            </a:r>
+            <a:r>
+              <a:rPr lang="en-US" dirty="0" smtClean="0"/>
+              <a:t>.</a:t>
+            </a:r>
+          </a:p>
+          <a:p>
+            <a:r>
+              <a:rPr lang="en-US" dirty="0">
+                <a:hlinkClick r:id="rId6"/>
+              </a:rPr>
+              <a:t>https://www.numpy.org/license.html</a:t>
+            </a:r>
+            <a:endParaRPr lang="en-US" dirty="0"/>
+          </a:p>
+        </p:txBody>
+      </p:sp>
+    </p:spTree>
+    <p:extLst>
+      <p:ext uri="{BB962C8B-B14F-4D97-AF65-F5344CB8AC3E}">
+        <p14:creationId xmlns:p14="http://schemas.microsoft.com/office/powerpoint/2010/main" val="2520839692"/>
+      </p:ext>
+    </p:extLst>
+  </p:cSld>
+  <p:clrMapOvr>
+    <a:masterClrMapping/>
+  </p:clrMapOvr>
+  <p:timing>
+    <p:tnLst>
+      <p:par>
+        <p:cTn id="1" dur="indefinite" restart="never" nodeType="tmRoot"/>
+      </p:par>
+    </p:tnLst>
+  </p:timing>
+</p:sld>
+</file>
+
+<file path=ppt/slides/slide5.xml><?xml version="1.0" encoding="utf-8"?>
+<p:sld xmlns:a="http://schemas.openxmlformats.org/drawingml/2006/main" xmlns:r="http://schemas.openxmlformats.org/officeDocument/2006/relationships" xmlns:p="http://schemas.openxmlformats.org/presentationml/2006/main">
+  <p:cSld>
+    <p:spTree>
+      <p:nvGrpSpPr>
+        <p:cNvPr id="1" name=""/>
+        <p:cNvGrpSpPr/>
+        <p:nvPr/>
+      </p:nvGrpSpPr>
+      <p:grpSpPr>
+        <a:xfrm>
+          <a:off x="0" y="0"/>
+          <a:ext cx="0" cy="0"/>
+          <a:chOff x="0" y="0"/>
+          <a:chExt cx="0" cy="0"/>
+        </a:xfrm>
+      </p:grpSpPr>
+      <p:sp>
+        <p:nvSpPr>
+          <p:cNvPr id="2" name="Text Placeholder 1"/>
+          <p:cNvSpPr>
+            <a:spLocks noGrp="1"/>
+          </p:cNvSpPr>
+          <p:nvPr>
+            <p:ph type="body" sz="quarter" idx="14"/>
+          </p:nvPr>
+        </p:nvSpPr>
+        <p:spPr/>
+        <p:txBody>
+          <a:bodyPr/>
+          <a:lstStyle/>
+          <a:p>
+            <a:endParaRPr lang="en-US"/>
+          </a:p>
+        </p:txBody>
+      </p:sp>
+      <p:sp>
+        <p:nvSpPr>
+          <p:cNvPr id="3" name="Text Placeholder 2"/>
+          <p:cNvSpPr>
+            <a:spLocks noGrp="1"/>
+          </p:cNvSpPr>
+          <p:nvPr>
+            <p:ph type="body" sz="quarter" idx="13"/>
+          </p:nvPr>
+        </p:nvSpPr>
+        <p:spPr/>
+        <p:txBody>
+          <a:bodyPr/>
+          <a:lstStyle/>
+          <a:p>
+            <a:endParaRPr lang="en-US"/>
+          </a:p>
+        </p:txBody>
+      </p:sp>
+      <p:sp>
+        <p:nvSpPr>
+          <p:cNvPr id="5" name="Rectangle 4"/>
+          <p:cNvSpPr/>
+          <p:nvPr/>
+        </p:nvSpPr>
+        <p:spPr>
+          <a:xfrm>
+            <a:off x="762000" y="1066800"/>
+            <a:ext cx="8153400" cy="1969770"/>
+          </a:xfrm>
+          <a:prstGeom prst="rect">
+            <a:avLst/>
+          </a:prstGeom>
+        </p:spPr>
+        <p:txBody>
+          <a:bodyPr wrap="square">
+            <a:spAutoFit/>
+          </a:bodyPr>
+          <a:lstStyle/>
+          <a:p>
+            <a:r>
+              <a:rPr lang="en-US" sz="3200" b="1" dirty="0" err="1"/>
+              <a:t>Redis</a:t>
+            </a:r>
+            <a:r>
+              <a:rPr lang="en-US" dirty="0"/>
+              <a:t> is an open source (BSD licensed), in-memory data structure store, used as a database, cache and message broker. It supports data structures such as strings, hashes, lists, sets, sorted sets with range queries, bitmaps, </a:t>
+            </a:r>
+            <a:r>
+              <a:rPr lang="en-US" dirty="0" err="1"/>
+              <a:t>hyperloglogs</a:t>
+            </a:r>
+            <a:r>
+              <a:rPr lang="en-US" dirty="0"/>
+              <a:t>, geospatial indexes with radius queries and streams. </a:t>
+            </a:r>
+            <a:r>
+              <a:rPr lang="en-US" dirty="0" err="1"/>
+              <a:t>Redis</a:t>
+            </a:r>
+            <a:r>
+              <a:rPr lang="en-US" dirty="0"/>
+              <a:t> has built-in replication, </a:t>
+            </a:r>
+            <a:r>
+              <a:rPr lang="en-US" dirty="0" err="1"/>
+              <a:t>Lua</a:t>
+            </a:r>
+            <a:r>
+              <a:rPr lang="en-US" dirty="0"/>
+              <a:t> scripting, LRU eviction, transactions and different levels of on-disk persistence, and provides high availability via </a:t>
+            </a:r>
+            <a:r>
+              <a:rPr lang="en-US" dirty="0" err="1"/>
+              <a:t>Redis</a:t>
+            </a:r>
+            <a:r>
+              <a:rPr lang="en-US" dirty="0"/>
+              <a:t> Sentinel and automatic partitioning with </a:t>
+            </a:r>
+            <a:r>
+              <a:rPr lang="en-US" dirty="0" err="1"/>
+              <a:t>Redis</a:t>
+            </a:r>
+            <a:r>
+              <a:rPr lang="en-US" dirty="0"/>
+              <a:t> Cluster.</a:t>
+            </a:r>
+          </a:p>
+        </p:txBody>
+      </p:sp>
+      <p:sp>
+        <p:nvSpPr>
+          <p:cNvPr id="6" name="Rectangle 5"/>
+          <p:cNvSpPr/>
+          <p:nvPr/>
+        </p:nvSpPr>
+        <p:spPr>
+          <a:xfrm>
+            <a:off x="914400" y="3254149"/>
+            <a:ext cx="2981329" cy="369332"/>
+          </a:xfrm>
+          <a:prstGeom prst="rect">
+            <a:avLst/>
+          </a:prstGeom>
+        </p:spPr>
+        <p:txBody>
+          <a:bodyPr wrap="none">
+            <a:spAutoFit/>
+          </a:bodyPr>
+          <a:lstStyle/>
+          <a:p>
+            <a:r>
+              <a:rPr lang="en-US" dirty="0">
+                <a:hlinkClick r:id="rId2"/>
+              </a:rPr>
+              <a:t>https://redis.io/topics/license</a:t>
+            </a:r>
+            <a:endParaRPr lang="en-US" dirty="0"/>
+          </a:p>
+        </p:txBody>
+      </p:sp>
+    </p:spTree>
+    <p:extLst>
+      <p:ext uri="{BB962C8B-B14F-4D97-AF65-F5344CB8AC3E}">
+        <p14:creationId xmlns:p14="http://schemas.microsoft.com/office/powerpoint/2010/main" val="2121093543"/>
+      </p:ext>
+    </p:extLst>
+  </p:cSld>
+  <p:clrMapOvr>
+    <a:masterClrMapping/>
+  </p:clrMapOvr>
+  <p:timing>
+    <p:tnLst>
+      <p:par>
+        <p:cTn id="1" dur="indefinite" restart="never" nodeType="tmRoot"/>
+      </p:par>
+    </p:tnLst>
+  </p:timing>
+</p:sld>
+</file>
+
+<file path=ppt/slides/slide6.xml><?xml version="1.0" encoding="utf-8"?>
+<p:sld xmlns:a="http://schemas.openxmlformats.org/drawingml/2006/main" xmlns:r="http://schemas.openxmlformats.org/officeDocument/2006/relationships" xmlns:p="http://schemas.openxmlformats.org/presentationml/2006/main">
+  <p:cSld>
+    <p:spTree>
+      <p:nvGrpSpPr>
+        <p:cNvPr id="1" name=""/>
+        <p:cNvGrpSpPr/>
+        <p:nvPr/>
+      </p:nvGrpSpPr>
+      <p:grpSpPr>
+        <a:xfrm>
+          <a:off x="0" y="0"/>
+          <a:ext cx="0" cy="0"/>
+          <a:chOff x="0" y="0"/>
+          <a:chExt cx="0" cy="0"/>
+        </a:xfrm>
+      </p:grpSpPr>
+      <p:sp>
+        <p:nvSpPr>
+          <p:cNvPr id="2" name="Text Placeholder 1"/>
+          <p:cNvSpPr>
+            <a:spLocks noGrp="1"/>
+          </p:cNvSpPr>
+          <p:nvPr>
+            <p:ph type="body" sz="quarter" idx="14"/>
+          </p:nvPr>
+        </p:nvSpPr>
+        <p:spPr/>
+        <p:txBody>
+          <a:bodyPr/>
+          <a:lstStyle/>
+          <a:p>
+            <a:endParaRPr lang="en-US"/>
+          </a:p>
+        </p:txBody>
+      </p:sp>
+      <p:sp>
+        <p:nvSpPr>
+          <p:cNvPr id="3" name="Text Placeholder 2"/>
+          <p:cNvSpPr>
+            <a:spLocks noGrp="1"/>
+          </p:cNvSpPr>
+          <p:nvPr>
+            <p:ph type="body" sz="quarter" idx="13"/>
+          </p:nvPr>
+        </p:nvSpPr>
+        <p:spPr/>
+        <p:txBody>
+          <a:bodyPr/>
+          <a:lstStyle/>
+          <a:p>
+            <a:endParaRPr lang="en-US"/>
+          </a:p>
+        </p:txBody>
+      </p:sp>
+      <p:sp>
+        <p:nvSpPr>
+          <p:cNvPr id="4" name="Title 3"/>
+          <p:cNvSpPr>
+            <a:spLocks noGrp="1"/>
+          </p:cNvSpPr>
+          <p:nvPr>
+            <p:ph type="title"/>
+          </p:nvPr>
+        </p:nvSpPr>
+        <p:spPr>
+          <a:xfrm>
+            <a:off x="762000" y="304800"/>
+            <a:ext cx="5940000" cy="671292"/>
+          </a:xfrm>
+        </p:spPr>
+        <p:txBody>
+          <a:bodyPr/>
+          <a:lstStyle/>
+          <a:p>
+            <a:r>
+              <a:rPr lang="en-US" dirty="0" smtClean="0"/>
+              <a:t>Application  Architecture</a:t>
+            </a:r>
+            <a:endParaRPr lang="en-US" dirty="0"/>
+          </a:p>
+        </p:txBody>
+      </p:sp>
+      <p:sp>
+        <p:nvSpPr>
+          <p:cNvPr id="5" name="TextBox 4"/>
+          <p:cNvSpPr txBox="1"/>
+          <p:nvPr/>
+        </p:nvSpPr>
+        <p:spPr>
+          <a:xfrm>
+            <a:off x="3581400" y="2438400"/>
+            <a:ext cx="1752600" cy="369332"/>
+          </a:xfrm>
+          <a:prstGeom prst="rect">
+            <a:avLst/>
+          </a:prstGeom>
+          <a:noFill/>
+        </p:spPr>
+        <p:txBody>
+          <a:bodyPr wrap="square" rtlCol="0">
+            <a:spAutoFit/>
+          </a:bodyPr>
+          <a:lstStyle/>
+          <a:p>
+            <a:r>
+              <a:rPr lang="en-US" dirty="0" smtClean="0"/>
+              <a:t>Celery Worker </a:t>
+            </a:r>
+            <a:endParaRPr lang="en-US" dirty="0"/>
+          </a:p>
+        </p:txBody>
+      </p:sp>
+      <p:sp>
+        <p:nvSpPr>
+          <p:cNvPr id="6" name="TextBox 5"/>
+          <p:cNvSpPr txBox="1"/>
+          <p:nvPr/>
+        </p:nvSpPr>
+        <p:spPr>
+          <a:xfrm>
+            <a:off x="6901604" y="2479964"/>
+            <a:ext cx="1298998" cy="369332"/>
+          </a:xfrm>
+          <a:prstGeom prst="rect">
+            <a:avLst/>
+          </a:prstGeom>
+          <a:noFill/>
+        </p:spPr>
+        <p:txBody>
+          <a:bodyPr wrap="square" rtlCol="0">
+            <a:spAutoFit/>
+          </a:bodyPr>
+          <a:lstStyle/>
+          <a:p>
+            <a:r>
+              <a:rPr lang="en-US" dirty="0" smtClean="0"/>
+              <a:t>Celery Beat</a:t>
+            </a:r>
+            <a:endParaRPr lang="en-US" dirty="0"/>
+          </a:p>
+        </p:txBody>
+      </p:sp>
+      <p:sp>
+        <p:nvSpPr>
+          <p:cNvPr id="7" name="TextBox 6"/>
+          <p:cNvSpPr txBox="1"/>
+          <p:nvPr/>
+        </p:nvSpPr>
+        <p:spPr>
+          <a:xfrm>
+            <a:off x="609600" y="3387436"/>
+            <a:ext cx="1371600" cy="369332"/>
+          </a:xfrm>
+          <a:prstGeom prst="rect">
+            <a:avLst/>
+          </a:prstGeom>
+          <a:noFill/>
+        </p:spPr>
+        <p:txBody>
+          <a:bodyPr wrap="square" rtlCol="0">
+            <a:spAutoFit/>
+          </a:bodyPr>
+          <a:lstStyle/>
+          <a:p>
+            <a:r>
+              <a:rPr lang="en-US" dirty="0" smtClean="0"/>
+              <a:t>File System</a:t>
+            </a:r>
+            <a:endParaRPr lang="en-US" dirty="0"/>
+          </a:p>
+        </p:txBody>
+      </p:sp>
+      <p:sp>
+        <p:nvSpPr>
+          <p:cNvPr id="8" name="TextBox 7"/>
+          <p:cNvSpPr txBox="1"/>
+          <p:nvPr/>
+        </p:nvSpPr>
+        <p:spPr>
+          <a:xfrm>
+            <a:off x="2561214" y="4054555"/>
+            <a:ext cx="1676400" cy="369332"/>
+          </a:xfrm>
+          <a:prstGeom prst="rect">
+            <a:avLst/>
+          </a:prstGeom>
+          <a:noFill/>
+        </p:spPr>
+        <p:txBody>
+          <a:bodyPr wrap="square" rtlCol="0">
+            <a:spAutoFit/>
+          </a:bodyPr>
+          <a:lstStyle/>
+          <a:p>
+            <a:r>
+              <a:rPr lang="en-US" dirty="0" err="1" smtClean="0"/>
+              <a:t>Redis</a:t>
+            </a:r>
+            <a:r>
+              <a:rPr lang="en-US" dirty="0" smtClean="0"/>
+              <a:t> Database</a:t>
+            </a:r>
+            <a:endParaRPr lang="en-US" dirty="0"/>
+          </a:p>
+        </p:txBody>
+      </p:sp>
+      <p:sp>
+        <p:nvSpPr>
+          <p:cNvPr id="9" name="TextBox 8"/>
+          <p:cNvSpPr txBox="1"/>
+          <p:nvPr/>
+        </p:nvSpPr>
+        <p:spPr>
+          <a:xfrm>
+            <a:off x="3750732" y="5845222"/>
+            <a:ext cx="1752600" cy="369332"/>
+          </a:xfrm>
+          <a:prstGeom prst="rect">
+            <a:avLst/>
+          </a:prstGeom>
+          <a:noFill/>
+        </p:spPr>
+        <p:txBody>
+          <a:bodyPr wrap="square" rtlCol="0">
+            <a:spAutoFit/>
+          </a:bodyPr>
+          <a:lstStyle/>
+          <a:p>
+            <a:r>
+              <a:rPr lang="en-US" dirty="0" smtClean="0"/>
+              <a:t>Dash App</a:t>
+            </a:r>
+            <a:endParaRPr lang="en-US" dirty="0"/>
+          </a:p>
+        </p:txBody>
+      </p:sp>
+      <p:cxnSp>
+        <p:nvCxnSpPr>
+          <p:cNvPr id="22" name="Elbow Connector 21"/>
+          <p:cNvCxnSpPr>
+            <a:stCxn id="6" idx="1"/>
+          </p:cNvCxnSpPr>
+          <p:nvPr/>
+        </p:nvCxnSpPr>
+        <p:spPr>
+          <a:xfrm rot="10800000">
+            <a:off x="5029200" y="2623066"/>
+            <a:ext cx="1872404" cy="41564"/>
+          </a:xfrm>
+          <a:prstGeom prst="bentConnector3">
+            <a:avLst/>
+          </a:prstGeom>
+          <a:ln>
+            <a:tailEnd type="triangle"/>
+          </a:ln>
+        </p:spPr>
+        <p:style>
+          <a:lnRef idx="1">
+            <a:schemeClr val="accent1"/>
+          </a:lnRef>
+          <a:fillRef idx="0">
+            <a:schemeClr val="accent1"/>
+          </a:fillRef>
+          <a:effectRef idx="0">
+            <a:schemeClr val="accent1"/>
+          </a:effectRef>
+          <a:fontRef idx="minor">
+            <a:schemeClr val="tx1"/>
+          </a:fontRef>
+        </p:style>
+      </p:cxnSp>
+      <p:cxnSp>
+        <p:nvCxnSpPr>
+          <p:cNvPr id="29" name="Elbow Connector 28"/>
+          <p:cNvCxnSpPr>
+            <a:endCxn id="5" idx="1"/>
+          </p:cNvCxnSpPr>
+          <p:nvPr/>
+        </p:nvCxnSpPr>
+        <p:spPr>
+          <a:xfrm flipV="1">
+            <a:off x="1752600" y="2623066"/>
+            <a:ext cx="1828800" cy="992970"/>
+          </a:xfrm>
+          <a:prstGeom prst="bentConnector3">
+            <a:avLst/>
+          </a:prstGeom>
+          <a:ln>
+            <a:headEnd type="triangle"/>
+            <a:tailEnd type="triangle"/>
+          </a:ln>
+        </p:spPr>
+        <p:style>
+          <a:lnRef idx="1">
+            <a:schemeClr val="accent1"/>
+          </a:lnRef>
+          <a:fillRef idx="0">
+            <a:schemeClr val="accent1"/>
+          </a:fillRef>
+          <a:effectRef idx="0">
+            <a:schemeClr val="accent1"/>
+          </a:effectRef>
+          <a:fontRef idx="minor">
+            <a:schemeClr val="tx1"/>
+          </a:fontRef>
+        </p:style>
+      </p:cxnSp>
+      <p:cxnSp>
+        <p:nvCxnSpPr>
+          <p:cNvPr id="31" name="Elbow Connector 30"/>
+          <p:cNvCxnSpPr>
+            <a:stCxn id="5" idx="2"/>
+            <a:endCxn id="8" idx="0"/>
+          </p:cNvCxnSpPr>
+          <p:nvPr/>
+        </p:nvCxnSpPr>
+        <p:spPr>
+          <a:xfrm rot="5400000">
+            <a:off x="3305146" y="2902000"/>
+            <a:ext cx="1246823" cy="1058286"/>
+          </a:xfrm>
+          <a:prstGeom prst="bentConnector3">
+            <a:avLst/>
+          </a:prstGeom>
+          <a:ln>
+            <a:headEnd type="triangle"/>
+            <a:tailEnd type="triangle"/>
+          </a:ln>
+        </p:spPr>
+        <p:style>
+          <a:lnRef idx="1">
+            <a:schemeClr val="accent1"/>
+          </a:lnRef>
+          <a:fillRef idx="0">
+            <a:schemeClr val="accent1"/>
+          </a:fillRef>
+          <a:effectRef idx="0">
+            <a:schemeClr val="accent1"/>
+          </a:effectRef>
+          <a:fontRef idx="minor">
+            <a:schemeClr val="tx1"/>
+          </a:fontRef>
+        </p:style>
+      </p:cxnSp>
+      <p:cxnSp>
+        <p:nvCxnSpPr>
+          <p:cNvPr id="33" name="Elbow Connector 32"/>
+          <p:cNvCxnSpPr>
+            <a:stCxn id="8" idx="2"/>
+            <a:endCxn id="9" idx="0"/>
+          </p:cNvCxnSpPr>
+          <p:nvPr/>
+        </p:nvCxnSpPr>
+        <p:spPr>
+          <a:xfrm rot="16200000" flipH="1">
+            <a:off x="3302556" y="4520745"/>
+            <a:ext cx="1421335" cy="1227618"/>
+          </a:xfrm>
+          <a:prstGeom prst="bentConnector3">
+            <a:avLst/>
+          </a:prstGeom>
+          <a:ln>
+            <a:headEnd type="triangle"/>
+            <a:tailEnd type="triangle"/>
+          </a:ln>
+        </p:spPr>
+        <p:style>
+          <a:lnRef idx="1">
+            <a:schemeClr val="accent1"/>
+          </a:lnRef>
+          <a:fillRef idx="0">
+            <a:schemeClr val="accent1"/>
+          </a:fillRef>
+          <a:effectRef idx="0">
+            <a:schemeClr val="accent1"/>
+          </a:effectRef>
+          <a:fontRef idx="minor">
+            <a:schemeClr val="tx1"/>
+          </a:fontRef>
+        </p:style>
+      </p:cxnSp>
+      <p:pic>
+        <p:nvPicPr>
+          <p:cNvPr id="34" name="Picture 33"/>
+          <p:cNvPicPr>
+            <a:picLocks noChangeAspect="1"/>
+          </p:cNvPicPr>
+          <p:nvPr/>
+        </p:nvPicPr>
+        <p:blipFill>
+          <a:blip r:embed="rId2"/>
+          <a:stretch>
+            <a:fillRect/>
+          </a:stretch>
+        </p:blipFill>
+        <p:spPr>
+          <a:xfrm>
+            <a:off x="2091264" y="1079551"/>
+            <a:ext cx="3318936" cy="1309093"/>
+          </a:xfrm>
+          <a:prstGeom prst="rect">
+            <a:avLst/>
+          </a:prstGeom>
+        </p:spPr>
+      </p:pic>
+      <p:pic>
+        <p:nvPicPr>
+          <p:cNvPr id="35" name="Picture 34"/>
+          <p:cNvPicPr>
+            <a:picLocks noChangeAspect="1"/>
+          </p:cNvPicPr>
+          <p:nvPr/>
+        </p:nvPicPr>
+        <p:blipFill>
+          <a:blip r:embed="rId3"/>
+          <a:stretch>
+            <a:fillRect/>
+          </a:stretch>
+        </p:blipFill>
+        <p:spPr>
+          <a:xfrm>
+            <a:off x="5486400" y="1091128"/>
+            <a:ext cx="3490912" cy="1293570"/>
+          </a:xfrm>
+          <a:prstGeom prst="rect">
+            <a:avLst/>
+          </a:prstGeom>
+        </p:spPr>
+      </p:pic>
+      <p:pic>
+        <p:nvPicPr>
+          <p:cNvPr id="36" name="Picture 35"/>
+          <p:cNvPicPr>
+            <a:picLocks noChangeAspect="1"/>
+          </p:cNvPicPr>
+          <p:nvPr/>
+        </p:nvPicPr>
+        <p:blipFill>
+          <a:blip r:embed="rId4"/>
+          <a:stretch>
+            <a:fillRect/>
+          </a:stretch>
+        </p:blipFill>
+        <p:spPr>
+          <a:xfrm>
+            <a:off x="0" y="3800702"/>
+            <a:ext cx="2300287" cy="1703765"/>
+          </a:xfrm>
+          <a:prstGeom prst="rect">
+            <a:avLst/>
+          </a:prstGeom>
+        </p:spPr>
+      </p:pic>
+      <p:pic>
+        <p:nvPicPr>
+          <p:cNvPr id="37" name="Picture 36"/>
+          <p:cNvPicPr>
+            <a:picLocks noChangeAspect="1"/>
+          </p:cNvPicPr>
+          <p:nvPr/>
+        </p:nvPicPr>
+        <p:blipFill>
+          <a:blip r:embed="rId5"/>
+          <a:stretch>
+            <a:fillRect/>
+          </a:stretch>
+        </p:blipFill>
+        <p:spPr>
+          <a:xfrm>
+            <a:off x="5486400" y="2944562"/>
+            <a:ext cx="3490912" cy="1334377"/>
+          </a:xfrm>
+          <a:prstGeom prst="rect">
+            <a:avLst/>
+          </a:prstGeom>
+        </p:spPr>
+      </p:pic>
+      <p:pic>
+        <p:nvPicPr>
+          <p:cNvPr id="39" name="Picture 38"/>
+          <p:cNvPicPr>
+            <a:picLocks noChangeAspect="1"/>
+          </p:cNvPicPr>
+          <p:nvPr/>
+        </p:nvPicPr>
+        <p:blipFill>
+          <a:blip r:embed="rId6"/>
+          <a:stretch>
+            <a:fillRect/>
+          </a:stretch>
+        </p:blipFill>
+        <p:spPr>
+          <a:xfrm>
+            <a:off x="5486400" y="4882063"/>
+            <a:ext cx="3490912" cy="1339418"/>
+          </a:xfrm>
+          <a:prstGeom prst="rect">
+            <a:avLst/>
+          </a:prstGeom>
+        </p:spPr>
+      </p:pic>
+    </p:spTree>
+    <p:extLst>
+      <p:ext uri="{BB962C8B-B14F-4D97-AF65-F5344CB8AC3E}">
+        <p14:creationId xmlns:p14="http://schemas.microsoft.com/office/powerpoint/2010/main" val="2931767259"/>
+      </p:ext>
+    </p:extLst>
+  </p:cSld>
+  <p:clrMapOvr>
+    <a:masterClrMapping/>
+  </p:clrMapOvr>
+  <p:timing>
+    <p:tnLst>
+      <p:par>
+        <p:cTn id="1" dur="indefinite" restart="never" nodeType="tmRoot"/>
+      </p:par>
+    </p:tnLst>
+  </p:timing>
+</p:sld>
+</file>
+
+<file path=ppt/slides/slide7.xml><?xml version="1.0" encoding="utf-8"?>
+<p:sld xmlns:a="http://schemas.openxmlformats.org/drawingml/2006/main" xmlns:r="http://schemas.openxmlformats.org/officeDocument/2006/relationships" xmlns:p="http://schemas.openxmlformats.org/presentationml/2006/main">
+  <p:cSld>
+    <p:spTree>
+      <p:nvGrpSpPr>
+        <p:cNvPr id="1" name=""/>
+        <p:cNvGrpSpPr/>
+        <p:nvPr/>
+      </p:nvGrpSpPr>
+      <p:grpSpPr>
+        <a:xfrm>
+          <a:off x="0" y="0"/>
+          <a:ext cx="0" cy="0"/>
+          <a:chOff x="0" y="0"/>
+          <a:chExt cx="0" cy="0"/>
+        </a:xfrm>
+      </p:grpSpPr>
+      <p:sp>
+        <p:nvSpPr>
+          <p:cNvPr id="2" name="Text Placeholder 1"/>
+          <p:cNvSpPr>
+            <a:spLocks noGrp="1"/>
+          </p:cNvSpPr>
+          <p:nvPr>
+            <p:ph type="body" sz="quarter" idx="14"/>
+          </p:nvPr>
+        </p:nvSpPr>
+        <p:spPr/>
+        <p:txBody>
+          <a:bodyPr/>
+          <a:lstStyle/>
+          <a:p>
+            <a:endParaRPr lang="en-US"/>
+          </a:p>
+        </p:txBody>
+      </p:sp>
+      <p:sp>
+        <p:nvSpPr>
+          <p:cNvPr id="3" name="Text Placeholder 2"/>
+          <p:cNvSpPr>
+            <a:spLocks noGrp="1"/>
+          </p:cNvSpPr>
+          <p:nvPr>
+            <p:ph type="body" sz="quarter" idx="13"/>
+          </p:nvPr>
+        </p:nvSpPr>
+        <p:spPr/>
+        <p:txBody>
+          <a:bodyPr/>
+          <a:lstStyle/>
+          <a:p>
+            <a:endParaRPr lang="en-US"/>
+          </a:p>
+        </p:txBody>
+      </p:sp>
+      <p:sp>
+        <p:nvSpPr>
+          <p:cNvPr id="4" name="Title 3"/>
+          <p:cNvSpPr>
+            <a:spLocks noGrp="1"/>
+          </p:cNvSpPr>
+          <p:nvPr>
+            <p:ph type="title"/>
+          </p:nvPr>
+        </p:nvSpPr>
+        <p:spPr>
+          <a:xfrm>
+            <a:off x="685800" y="152400"/>
+            <a:ext cx="5940000" cy="671292"/>
+          </a:xfrm>
+        </p:spPr>
+        <p:txBody>
+          <a:bodyPr/>
+          <a:lstStyle/>
+          <a:p>
+            <a:r>
+              <a:rPr lang="en-US" dirty="0" smtClean="0"/>
+              <a:t>Dash App Architecture </a:t>
+            </a:r>
+            <a:endParaRPr lang="en-US" dirty="0"/>
+          </a:p>
+        </p:txBody>
+      </p:sp>
+      <p:sp>
+        <p:nvSpPr>
+          <p:cNvPr id="5" name="Rectangle 1"/>
+          <p:cNvSpPr>
+            <a:spLocks noChangeArrowheads="1"/>
+          </p:cNvSpPr>
+          <p:nvPr/>
+        </p:nvSpPr>
+        <p:spPr bwMode="auto">
+          <a:xfrm>
+            <a:off x="152400" y="1371600"/>
+            <a:ext cx="8839200" cy="1523494"/>
+          </a:xfrm>
+          <a:prstGeom prst="rect">
+            <a:avLst/>
+          </a:prstGeom>
+          <a:solidFill>
+            <a:srgbClr val="FFFFFF"/>
+          </a:solidFill>
+          <a:ln>
+            <a:noFill/>
+          </a:ln>
+          <a:effectLst/>
+          <a:extLst>
+            <a:ext uri="{91240B29-F687-4F45-9708-019B960494DF}">
+              <a14:hiddenLine xmlns:a14="http://schemas.microsoft.com/office/drawing/2010/main" w="9525">
+                <a:solidFill>
+                  <a:schemeClr val="tx1"/>
+                </a:solidFill>
+                <a:miter lim="800000"/>
+                <a:headEnd/>
+                <a:tailEnd/>
+              </a14:hiddenLine>
+            </a:ext>
+            <a:ext uri="{AF507438-7753-43E0-B8FC-AC1667EBCBE1}">
+              <a14:hiddenEffects xmlns:a14="http://schemas.microsoft.com/office/drawing/2010/main">
+                <a:effectLst>
+                  <a:outerShdw dist="35921" dir="2700000" algn="ctr" rotWithShape="0">
+                    <a:schemeClr val="bg2"/>
+                  </a:outerShdw>
+                </a:effectLst>
+              </a14:hiddenEffects>
+            </a:ext>
+          </a:extLst>
+        </p:spPr>
+        <p:txBody>
+          <a:bodyPr vert="horz" wrap="square" lIns="91440" tIns="0" rIns="91440" bIns="45720" numCol="1" anchor="ctr" anchorCtr="0" compatLnSpc="1">
+            <a:prstTxWarp prst="textNoShape">
+              <a:avLst/>
+            </a:prstTxWarp>
+            <a:spAutoFit/>
+          </a:bodyPr>
+          <a:lstStyle>
+            <a:lvl1pPr eaLnBrk="0" fontAlgn="base" hangingPunct="0">
+              <a:spcBef>
+                <a:spcPct val="0"/>
+              </a:spcBef>
+              <a:spcAft>
+                <a:spcPct val="0"/>
+              </a:spcAft>
+              <a:defRPr>
+                <a:solidFill>
+                  <a:schemeClr val="tx1"/>
+                </a:solidFill>
+                <a:latin typeface="Arial" panose="020B0604020202020204" pitchFamily="34" charset="0"/>
+              </a:defRPr>
+            </a:lvl1pPr>
+            <a:lvl2pPr eaLnBrk="0" fontAlgn="base" hangingPunct="0">
+              <a:spcBef>
+                <a:spcPct val="0"/>
+              </a:spcBef>
+              <a:spcAft>
+                <a:spcPct val="0"/>
+              </a:spcAft>
+              <a:defRPr>
+                <a:solidFill>
+                  <a:schemeClr val="tx1"/>
+                </a:solidFill>
+                <a:latin typeface="Arial" panose="020B0604020202020204" pitchFamily="34" charset="0"/>
+              </a:defRPr>
+            </a:lvl2pPr>
+            <a:lvl3pPr eaLnBrk="0" fontAlgn="base" hangingPunct="0">
+              <a:spcBef>
+                <a:spcPct val="0"/>
+              </a:spcBef>
+              <a:spcAft>
+                <a:spcPct val="0"/>
+              </a:spcAft>
+              <a:defRPr>
+                <a:solidFill>
+                  <a:schemeClr val="tx1"/>
+                </a:solidFill>
+                <a:latin typeface="Arial" panose="020B0604020202020204" pitchFamily="34" charset="0"/>
+              </a:defRPr>
+            </a:lvl3pPr>
+            <a:lvl4pPr eaLnBrk="0" fontAlgn="base" hangingPunct="0">
+              <a:spcBef>
+                <a:spcPct val="0"/>
+              </a:spcBef>
+              <a:spcAft>
+                <a:spcPct val="0"/>
+              </a:spcAft>
+              <a:defRPr>
+                <a:solidFill>
+                  <a:schemeClr val="tx1"/>
+                </a:solidFill>
+                <a:latin typeface="Arial" panose="020B0604020202020204" pitchFamily="34" charset="0"/>
+              </a:defRPr>
+            </a:lvl4pPr>
+            <a:lvl5pPr eaLnBrk="0" fontAlgn="base" hangingPunct="0">
+              <a:spcBef>
+                <a:spcPct val="0"/>
+              </a:spcBef>
+              <a:spcAft>
+                <a:spcPct val="0"/>
+              </a:spcAft>
+              <a:defRPr>
+                <a:solidFill>
+                  <a:schemeClr val="tx1"/>
+                </a:solidFill>
+                <a:latin typeface="Arial" panose="020B0604020202020204" pitchFamily="34" charset="0"/>
+              </a:defRPr>
+            </a:lvl5pPr>
+            <a:lvl6pPr eaLnBrk="0" fontAlgn="base" hangingPunct="0">
+              <a:spcBef>
+                <a:spcPct val="0"/>
+              </a:spcBef>
+              <a:spcAft>
+                <a:spcPct val="0"/>
+              </a:spcAft>
+              <a:defRPr>
+                <a:solidFill>
+                  <a:schemeClr val="tx1"/>
+                </a:solidFill>
+                <a:latin typeface="Arial" panose="020B0604020202020204" pitchFamily="34" charset="0"/>
+              </a:defRPr>
+            </a:lvl6pPr>
+            <a:lvl7pPr eaLnBrk="0" fontAlgn="base" hangingPunct="0">
+              <a:spcBef>
+                <a:spcPct val="0"/>
+              </a:spcBef>
+              <a:spcAft>
+                <a:spcPct val="0"/>
+              </a:spcAft>
+              <a:defRPr>
+                <a:solidFill>
+                  <a:schemeClr val="tx1"/>
+                </a:solidFill>
+                <a:latin typeface="Arial" panose="020B0604020202020204" pitchFamily="34" charset="0"/>
+              </a:defRPr>
+            </a:lvl7pPr>
+            <a:lvl8pPr eaLnBrk="0" fontAlgn="base" hangingPunct="0">
+              <a:spcBef>
+                <a:spcPct val="0"/>
+              </a:spcBef>
+              <a:spcAft>
+                <a:spcPct val="0"/>
+              </a:spcAft>
+              <a:defRPr>
+                <a:solidFill>
+                  <a:schemeClr val="tx1"/>
+                </a:solidFill>
+                <a:latin typeface="Arial" panose="020B0604020202020204" pitchFamily="34" charset="0"/>
+              </a:defRPr>
+            </a:lvl8pPr>
+            <a:lvl9pPr eaLnBrk="0" fontAlgn="base" hangingPunct="0">
+              <a:spcBef>
+                <a:spcPct val="0"/>
+              </a:spcBef>
+              <a:spcAft>
+                <a:spcPct val="0"/>
+              </a:spcAft>
+              <a:defRPr>
+                <a:solidFill>
+                  <a:schemeClr val="tx1"/>
+                </a:solidFill>
+                <a:latin typeface="Arial" panose="020B0604020202020204" pitchFamily="34" charset="0"/>
+              </a:defRPr>
+            </a:lvl9pPr>
+          </a:lstStyle>
+          <a:p>
+            <a:pPr marL="0" marR="0" lvl="0" indent="0" algn="l" defTabSz="914400" rtl="0" eaLnBrk="0" fontAlgn="base" latinLnBrk="0" hangingPunct="0">
+              <a:lnSpc>
+                <a:spcPct val="100000"/>
+              </a:lnSpc>
+              <a:spcBef>
+                <a:spcPct val="0"/>
+              </a:spcBef>
+              <a:spcAft>
+                <a:spcPct val="0"/>
+              </a:spcAft>
+              <a:buClrTx/>
+              <a:buSzTx/>
+              <a:buFontTx/>
+              <a:buNone/>
+              <a:tabLst/>
+            </a:pPr>
+            <a:r>
+              <a:rPr kumimoji="0" lang="en-US" altLang="en-US" sz="1200" b="0" i="0" u="none" strike="noStrike" cap="none" normalizeH="0" baseline="0" dirty="0" smtClean="0">
+                <a:ln>
+                  <a:noFill/>
+                </a:ln>
+                <a:solidFill>
+                  <a:srgbClr val="2A3F5F"/>
+                </a:solidFill>
+                <a:effectLst/>
+                <a:latin typeface="Dosis"/>
+              </a:rPr>
+              <a:t>Structuring a Multi-Page App</a:t>
+            </a:r>
+          </a:p>
+          <a:p>
+            <a:pPr marL="0" marR="0" lvl="0" indent="0" algn="l" defTabSz="914400" rtl="0" eaLnBrk="0" fontAlgn="base" latinLnBrk="0" hangingPunct="0">
+              <a:lnSpc>
+                <a:spcPct val="100000"/>
+              </a:lnSpc>
+              <a:spcBef>
+                <a:spcPct val="0"/>
+              </a:spcBef>
+              <a:spcAft>
+                <a:spcPct val="0"/>
+              </a:spcAft>
+              <a:buClrTx/>
+              <a:buSzTx/>
+              <a:buFontTx/>
+              <a:buNone/>
+              <a:tabLst/>
+            </a:pPr>
+            <a:r>
+              <a:rPr kumimoji="0" lang="en-US" altLang="en-US" sz="1200" b="0" i="0" u="none" strike="noStrike" cap="none" normalizeH="0" baseline="0" dirty="0" smtClean="0">
+                <a:ln>
+                  <a:noFill/>
+                </a:ln>
+                <a:solidFill>
+                  <a:srgbClr val="506784"/>
+                </a:solidFill>
+                <a:effectLst/>
+                <a:latin typeface="Open Sans"/>
+              </a:rPr>
+              <a:t>Here's how to structure a multi-page app, where each app is contained in a separate file.</a:t>
+            </a:r>
+            <a:endParaRPr kumimoji="0" lang="en-US" altLang="en-US" sz="600" b="0" i="0" u="none" strike="noStrike" cap="none" normalizeH="0" baseline="0" dirty="0" smtClean="0">
+              <a:ln>
+                <a:noFill/>
+              </a:ln>
+              <a:solidFill>
+                <a:schemeClr val="tx1"/>
+              </a:solidFill>
+              <a:effectLst/>
+            </a:endParaRPr>
+          </a:p>
+          <a:p>
+            <a:pPr marL="0" marR="0" lvl="0" indent="0" algn="l" defTabSz="914400" rtl="0" eaLnBrk="0" fontAlgn="base" latinLnBrk="0" hangingPunct="0">
+              <a:lnSpc>
+                <a:spcPct val="100000"/>
+              </a:lnSpc>
+              <a:spcBef>
+                <a:spcPct val="0"/>
+              </a:spcBef>
+              <a:spcAft>
+                <a:spcPct val="0"/>
+              </a:spcAft>
+              <a:buClrTx/>
+              <a:buSzTx/>
+              <a:buFontTx/>
+              <a:buNone/>
+              <a:tabLst/>
+            </a:pPr>
+            <a:r>
+              <a:rPr kumimoji="0" lang="en-US" altLang="en-US" sz="1200" b="0" i="0" u="none" strike="noStrike" cap="none" normalizeH="0" baseline="0" dirty="0" smtClean="0">
+                <a:ln>
+                  <a:noFill/>
+                </a:ln>
+                <a:solidFill>
+                  <a:srgbClr val="506784"/>
+                </a:solidFill>
+                <a:effectLst/>
+                <a:latin typeface="Open Sans"/>
+              </a:rPr>
+              <a:t>File structure:</a:t>
+            </a:r>
+            <a:endParaRPr kumimoji="0" lang="en-US" altLang="en-US" sz="1000" b="0" i="0" u="none" strike="noStrike" cap="none" normalizeH="0" baseline="0" dirty="0" smtClean="0">
+              <a:ln>
+                <a:noFill/>
+              </a:ln>
+              <a:solidFill>
+                <a:srgbClr val="506784"/>
+              </a:solidFill>
+              <a:effectLst/>
+              <a:latin typeface="Arial Unicode MS"/>
+            </a:endParaRPr>
+          </a:p>
+          <a:p>
+            <a:pPr marL="171450" marR="0" lvl="0" indent="-171450" algn="l" defTabSz="914400" rtl="0" eaLnBrk="0" fontAlgn="base" latinLnBrk="0" hangingPunct="0">
+              <a:lnSpc>
+                <a:spcPct val="100000"/>
+              </a:lnSpc>
+              <a:spcBef>
+                <a:spcPct val="0"/>
+              </a:spcBef>
+              <a:spcAft>
+                <a:spcPct val="0"/>
+              </a:spcAft>
+              <a:buClrTx/>
+              <a:buSzTx/>
+              <a:buFontTx/>
+              <a:buChar char="-"/>
+              <a:tabLst/>
+            </a:pPr>
+            <a:r>
+              <a:rPr kumimoji="0" lang="en-US" altLang="en-US" sz="1000" b="0" i="0" u="none" strike="noStrike" cap="none" normalizeH="0" baseline="0" dirty="0" smtClean="0">
+                <a:ln>
+                  <a:noFill/>
+                </a:ln>
+                <a:solidFill>
+                  <a:srgbClr val="506784"/>
+                </a:solidFill>
+                <a:effectLst/>
+                <a:latin typeface="Arial Unicode MS"/>
+              </a:rPr>
+              <a:t>app.py</a:t>
+            </a:r>
+          </a:p>
+          <a:p>
+            <a:pPr marL="171450" marR="0" lvl="0" indent="-171450" algn="l" defTabSz="914400" rtl="0" eaLnBrk="0" fontAlgn="base" latinLnBrk="0" hangingPunct="0">
+              <a:lnSpc>
+                <a:spcPct val="100000"/>
+              </a:lnSpc>
+              <a:spcBef>
+                <a:spcPct val="0"/>
+              </a:spcBef>
+              <a:spcAft>
+                <a:spcPct val="0"/>
+              </a:spcAft>
+              <a:buClrTx/>
+              <a:buSzTx/>
+              <a:buFontTx/>
+              <a:buChar char="-"/>
+              <a:tabLst/>
+            </a:pPr>
+            <a:r>
+              <a:rPr kumimoji="0" lang="en-US" altLang="en-US" sz="1000" b="0" i="0" u="none" strike="noStrike" cap="none" normalizeH="0" baseline="0" dirty="0" smtClean="0">
+                <a:ln>
+                  <a:noFill/>
+                </a:ln>
+                <a:solidFill>
+                  <a:srgbClr val="506784"/>
+                </a:solidFill>
+                <a:effectLst/>
+                <a:latin typeface="Arial Unicode MS"/>
+              </a:rPr>
+              <a:t>index.py </a:t>
+            </a:r>
+          </a:p>
+          <a:p>
+            <a:pPr marL="171450" marR="0" lvl="0" indent="-171450" algn="l" defTabSz="914400" rtl="0" eaLnBrk="0" fontAlgn="base" latinLnBrk="0" hangingPunct="0">
+              <a:lnSpc>
+                <a:spcPct val="100000"/>
+              </a:lnSpc>
+              <a:spcBef>
+                <a:spcPct val="0"/>
+              </a:spcBef>
+              <a:spcAft>
+                <a:spcPct val="0"/>
+              </a:spcAft>
+              <a:buClrTx/>
+              <a:buSzTx/>
+              <a:buFontTx/>
+              <a:buChar char="-"/>
+              <a:tabLst/>
+            </a:pPr>
+            <a:r>
+              <a:rPr kumimoji="0" lang="en-US" altLang="en-US" sz="1000" b="0" i="0" u="none" strike="noStrike" cap="none" normalizeH="0" baseline="0" dirty="0" smtClean="0">
+                <a:ln>
+                  <a:noFill/>
+                </a:ln>
+                <a:solidFill>
+                  <a:srgbClr val="506784"/>
+                </a:solidFill>
+                <a:effectLst/>
+                <a:latin typeface="Arial Unicode MS"/>
+              </a:rPr>
+              <a:t>apps </a:t>
+            </a:r>
+          </a:p>
+          <a:p>
+            <a:pPr marR="0" lvl="0" algn="l" defTabSz="914400" rtl="0" eaLnBrk="0" fontAlgn="base" latinLnBrk="0" hangingPunct="0">
+              <a:lnSpc>
+                <a:spcPct val="100000"/>
+              </a:lnSpc>
+              <a:spcBef>
+                <a:spcPct val="0"/>
+              </a:spcBef>
+              <a:spcAft>
+                <a:spcPct val="0"/>
+              </a:spcAft>
+              <a:buClrTx/>
+              <a:buSzTx/>
+              <a:tabLst/>
+            </a:pPr>
+            <a:r>
+              <a:rPr lang="en-US" altLang="en-US" sz="1000" dirty="0" smtClean="0">
+                <a:solidFill>
+                  <a:srgbClr val="506784"/>
+                </a:solidFill>
+                <a:latin typeface="Arial Unicode MS"/>
+              </a:rPr>
+              <a:t>           </a:t>
+            </a:r>
+            <a:r>
+              <a:rPr lang="en-US" altLang="en-US" sz="1000" dirty="0">
+                <a:solidFill>
+                  <a:srgbClr val="506784"/>
+                </a:solidFill>
+                <a:latin typeface="Arial Unicode MS"/>
+              </a:rPr>
+              <a:t>	</a:t>
+            </a:r>
+            <a:r>
+              <a:rPr kumimoji="0" lang="en-US" altLang="en-US" sz="1000" b="0" i="0" u="none" strike="noStrike" cap="none" normalizeH="0" baseline="0" dirty="0" smtClean="0">
+                <a:ln>
+                  <a:noFill/>
+                </a:ln>
+                <a:solidFill>
+                  <a:srgbClr val="506784"/>
+                </a:solidFill>
+                <a:effectLst/>
+                <a:latin typeface="Arial Unicode MS"/>
+              </a:rPr>
+              <a:t>-- __init__.py </a:t>
+            </a:r>
+          </a:p>
+          <a:p>
+            <a:pPr marR="0" lvl="0" algn="l" defTabSz="914400" rtl="0" eaLnBrk="0" fontAlgn="base" latinLnBrk="0" hangingPunct="0">
+              <a:lnSpc>
+                <a:spcPct val="100000"/>
+              </a:lnSpc>
+              <a:spcBef>
+                <a:spcPct val="0"/>
+              </a:spcBef>
+              <a:spcAft>
+                <a:spcPct val="0"/>
+              </a:spcAft>
+              <a:buClrTx/>
+              <a:buSzTx/>
+              <a:tabLst/>
+            </a:pPr>
+            <a:r>
+              <a:rPr lang="en-US" altLang="en-US" sz="1000" dirty="0">
+                <a:solidFill>
+                  <a:srgbClr val="506784"/>
+                </a:solidFill>
+                <a:latin typeface="Arial Unicode MS"/>
+              </a:rPr>
+              <a:t>	</a:t>
+            </a:r>
+            <a:r>
+              <a:rPr kumimoji="0" lang="en-US" altLang="en-US" sz="1000" b="0" i="0" u="none" strike="noStrike" cap="none" normalizeH="0" baseline="0" dirty="0" smtClean="0">
+                <a:ln>
+                  <a:noFill/>
+                </a:ln>
+                <a:solidFill>
+                  <a:srgbClr val="506784"/>
+                </a:solidFill>
+                <a:effectLst/>
+                <a:latin typeface="Arial Unicode MS"/>
+              </a:rPr>
+              <a:t>-- app1.py </a:t>
+            </a:r>
+          </a:p>
+          <a:p>
+            <a:pPr marR="0" lvl="0" algn="l" defTabSz="914400" rtl="0" eaLnBrk="0" fontAlgn="base" latinLnBrk="0" hangingPunct="0">
+              <a:lnSpc>
+                <a:spcPct val="100000"/>
+              </a:lnSpc>
+              <a:spcBef>
+                <a:spcPct val="0"/>
+              </a:spcBef>
+              <a:spcAft>
+                <a:spcPct val="0"/>
+              </a:spcAft>
+              <a:buClrTx/>
+              <a:buSzTx/>
+              <a:tabLst/>
+            </a:pPr>
+            <a:r>
+              <a:rPr lang="en-US" altLang="en-US" sz="1000" dirty="0">
+                <a:solidFill>
+                  <a:srgbClr val="506784"/>
+                </a:solidFill>
+                <a:latin typeface="Arial Unicode MS"/>
+              </a:rPr>
+              <a:t>	</a:t>
+            </a:r>
+            <a:r>
+              <a:rPr kumimoji="0" lang="en-US" altLang="en-US" sz="1000" b="0" i="0" u="none" strike="noStrike" cap="none" normalizeH="0" baseline="0" dirty="0" smtClean="0">
+                <a:ln>
+                  <a:noFill/>
+                </a:ln>
+                <a:solidFill>
+                  <a:srgbClr val="506784"/>
+                </a:solidFill>
+                <a:effectLst/>
+                <a:latin typeface="Arial Unicode MS"/>
+              </a:rPr>
+              <a:t>-- app2.py</a:t>
+            </a:r>
+            <a:r>
+              <a:rPr kumimoji="0" lang="en-US" altLang="en-US" sz="600" b="0" i="0" u="none" strike="noStrike" cap="none" normalizeH="0" baseline="0" dirty="0" smtClean="0">
+                <a:ln>
+                  <a:noFill/>
+                </a:ln>
+                <a:solidFill>
+                  <a:schemeClr val="tx1"/>
+                </a:solidFill>
+                <a:effectLst/>
+              </a:rPr>
+              <a:t> </a:t>
+            </a:r>
+            <a:endParaRPr kumimoji="0" lang="en-US" altLang="en-US" sz="1800" b="0" i="0" u="none" strike="noStrike" cap="none" normalizeH="0" baseline="0" dirty="0" smtClean="0">
+              <a:ln>
+                <a:noFill/>
+              </a:ln>
+              <a:solidFill>
+                <a:schemeClr val="tx1"/>
+              </a:solidFill>
+              <a:effectLst/>
+              <a:latin typeface="Arial" panose="020B0604020202020204" pitchFamily="34" charset="0"/>
+            </a:endParaRPr>
+          </a:p>
+        </p:txBody>
+      </p:sp>
+      <p:sp>
+        <p:nvSpPr>
+          <p:cNvPr id="7" name="Rectangle 3"/>
+          <p:cNvSpPr>
+            <a:spLocks noChangeArrowheads="1"/>
+          </p:cNvSpPr>
+          <p:nvPr/>
+        </p:nvSpPr>
+        <p:spPr bwMode="auto">
+          <a:xfrm>
+            <a:off x="152400" y="3069367"/>
+            <a:ext cx="8839200" cy="2954655"/>
+          </a:xfrm>
+          <a:prstGeom prst="rect">
+            <a:avLst/>
+          </a:prstGeom>
+          <a:solidFill>
+            <a:srgbClr val="F3F6FB"/>
+          </a:solidFill>
+          <a:ln>
+            <a:noFill/>
+          </a:ln>
+          <a:effectLst/>
+          <a:extLst>
+            <a:ext uri="{91240B29-F687-4F45-9708-019B960494DF}">
+              <a14:hiddenLine xmlns:a14="http://schemas.microsoft.com/office/drawing/2010/main" w="9525">
+                <a:solidFill>
+                  <a:schemeClr val="tx1"/>
+                </a:solidFill>
+                <a:miter lim="800000"/>
+                <a:headEnd/>
+                <a:tailEnd/>
+              </a14:hiddenLine>
+            </a:ext>
+            <a:ext uri="{AF507438-7753-43E0-B8FC-AC1667EBCBE1}">
+              <a14:hiddenEffects xmlns:a14="http://schemas.microsoft.com/office/drawing/2010/main">
+                <a:effectLst>
+                  <a:outerShdw dist="35921" dir="2700000" algn="ctr" rotWithShape="0">
+                    <a:schemeClr val="bg2"/>
+                  </a:outerShdw>
+                </a:effectLst>
+              </a14:hiddenEffects>
+            </a:ext>
+          </a:extLst>
+        </p:spPr>
+        <p:txBody>
+          <a:bodyPr vert="horz" wrap="square" lIns="91440" tIns="45720" rIns="91440" bIns="45720" numCol="1" anchor="ctr" anchorCtr="0" compatLnSpc="1">
+            <a:prstTxWarp prst="textNoShape">
+              <a:avLst/>
+            </a:prstTxWarp>
+            <a:spAutoFit/>
+          </a:bodyPr>
+          <a:lstStyle>
+            <a:lvl1pPr eaLnBrk="0" fontAlgn="base" hangingPunct="0">
+              <a:spcBef>
+                <a:spcPct val="0"/>
+              </a:spcBef>
+              <a:spcAft>
+                <a:spcPct val="0"/>
+              </a:spcAft>
+              <a:defRPr>
+                <a:solidFill>
+                  <a:schemeClr val="tx1"/>
+                </a:solidFill>
+                <a:latin typeface="Arial" panose="020B0604020202020204" pitchFamily="34" charset="0"/>
+              </a:defRPr>
+            </a:lvl1pPr>
+            <a:lvl2pPr eaLnBrk="0" fontAlgn="base" hangingPunct="0">
+              <a:spcBef>
+                <a:spcPct val="0"/>
+              </a:spcBef>
+              <a:spcAft>
+                <a:spcPct val="0"/>
+              </a:spcAft>
+              <a:defRPr>
+                <a:solidFill>
+                  <a:schemeClr val="tx1"/>
+                </a:solidFill>
+                <a:latin typeface="Arial" panose="020B0604020202020204" pitchFamily="34" charset="0"/>
+              </a:defRPr>
+            </a:lvl2pPr>
+            <a:lvl3pPr eaLnBrk="0" fontAlgn="base" hangingPunct="0">
+              <a:spcBef>
+                <a:spcPct val="0"/>
+              </a:spcBef>
+              <a:spcAft>
+                <a:spcPct val="0"/>
+              </a:spcAft>
+              <a:defRPr>
+                <a:solidFill>
+                  <a:schemeClr val="tx1"/>
+                </a:solidFill>
+                <a:latin typeface="Arial" panose="020B0604020202020204" pitchFamily="34" charset="0"/>
+              </a:defRPr>
+            </a:lvl3pPr>
+            <a:lvl4pPr eaLnBrk="0" fontAlgn="base" hangingPunct="0">
+              <a:spcBef>
+                <a:spcPct val="0"/>
+              </a:spcBef>
+              <a:spcAft>
+                <a:spcPct val="0"/>
+              </a:spcAft>
+              <a:defRPr>
+                <a:solidFill>
+                  <a:schemeClr val="tx1"/>
+                </a:solidFill>
+                <a:latin typeface="Arial" panose="020B0604020202020204" pitchFamily="34" charset="0"/>
+              </a:defRPr>
+            </a:lvl4pPr>
+            <a:lvl5pPr eaLnBrk="0" fontAlgn="base" hangingPunct="0">
+              <a:spcBef>
+                <a:spcPct val="0"/>
+              </a:spcBef>
+              <a:spcAft>
+                <a:spcPct val="0"/>
+              </a:spcAft>
+              <a:defRPr>
+                <a:solidFill>
+                  <a:schemeClr val="tx1"/>
+                </a:solidFill>
+                <a:latin typeface="Arial" panose="020B0604020202020204" pitchFamily="34" charset="0"/>
+              </a:defRPr>
+            </a:lvl5pPr>
+            <a:lvl6pPr eaLnBrk="0" fontAlgn="base" hangingPunct="0">
+              <a:spcBef>
+                <a:spcPct val="0"/>
+              </a:spcBef>
+              <a:spcAft>
+                <a:spcPct val="0"/>
+              </a:spcAft>
+              <a:defRPr>
+                <a:solidFill>
+                  <a:schemeClr val="tx1"/>
+                </a:solidFill>
+                <a:latin typeface="Arial" panose="020B0604020202020204" pitchFamily="34" charset="0"/>
+              </a:defRPr>
+            </a:lvl6pPr>
+            <a:lvl7pPr eaLnBrk="0" fontAlgn="base" hangingPunct="0">
+              <a:spcBef>
+                <a:spcPct val="0"/>
+              </a:spcBef>
+              <a:spcAft>
+                <a:spcPct val="0"/>
+              </a:spcAft>
+              <a:defRPr>
+                <a:solidFill>
+                  <a:schemeClr val="tx1"/>
+                </a:solidFill>
+                <a:latin typeface="Arial" panose="020B0604020202020204" pitchFamily="34" charset="0"/>
+              </a:defRPr>
+            </a:lvl7pPr>
+            <a:lvl8pPr eaLnBrk="0" fontAlgn="base" hangingPunct="0">
+              <a:spcBef>
+                <a:spcPct val="0"/>
+              </a:spcBef>
+              <a:spcAft>
+                <a:spcPct val="0"/>
+              </a:spcAft>
+              <a:defRPr>
+                <a:solidFill>
+                  <a:schemeClr val="tx1"/>
+                </a:solidFill>
+                <a:latin typeface="Arial" panose="020B0604020202020204" pitchFamily="34" charset="0"/>
+              </a:defRPr>
+            </a:lvl8pPr>
+            <a:lvl9pPr eaLnBrk="0" fontAlgn="base" hangingPunct="0">
+              <a:spcBef>
+                <a:spcPct val="0"/>
+              </a:spcBef>
+              <a:spcAft>
+                <a:spcPct val="0"/>
+              </a:spcAft>
+              <a:defRPr>
+                <a:solidFill>
+                  <a:schemeClr val="tx1"/>
+                </a:solidFill>
+                <a:latin typeface="Arial" panose="020B0604020202020204" pitchFamily="34" charset="0"/>
+              </a:defRPr>
+            </a:lvl9pPr>
+          </a:lstStyle>
+          <a:p>
+            <a:pPr marL="0" marR="0" lvl="0" indent="0" algn="l" defTabSz="914400" rtl="0" eaLnBrk="0" fontAlgn="base" latinLnBrk="0" hangingPunct="0">
+              <a:lnSpc>
+                <a:spcPct val="100000"/>
+              </a:lnSpc>
+              <a:spcBef>
+                <a:spcPct val="0"/>
+              </a:spcBef>
+              <a:spcAft>
+                <a:spcPct val="0"/>
+              </a:spcAft>
+              <a:buClrTx/>
+              <a:buSzTx/>
+              <a:buFontTx/>
+              <a:buNone/>
+              <a:tabLst/>
+            </a:pPr>
+            <a:r>
+              <a:rPr kumimoji="0" lang="en-US" altLang="en-US" sz="1200" b="0" i="0" u="none" strike="noStrike" cap="none" normalizeH="0" baseline="0" dirty="0" smtClean="0">
+                <a:ln>
+                  <a:noFill/>
+                </a:ln>
+                <a:solidFill>
+                  <a:srgbClr val="506784"/>
+                </a:solidFill>
+                <a:effectLst/>
+                <a:latin typeface="Open Sans"/>
+              </a:rPr>
+              <a:t>It is worth noting that in both of these project structures, the Dash instance is defined in a separate </a:t>
+            </a:r>
+            <a:r>
+              <a:rPr kumimoji="0" lang="en-US" altLang="en-US" sz="900" b="0" i="0" u="none" strike="noStrike" cap="none" normalizeH="0" baseline="0" dirty="0" smtClean="0">
+                <a:ln>
+                  <a:noFill/>
+                </a:ln>
+                <a:solidFill>
+                  <a:srgbClr val="506784"/>
+                </a:solidFill>
+                <a:effectLst/>
+                <a:latin typeface="Arial Unicode MS"/>
+              </a:rPr>
+              <a:t>app.py</a:t>
+            </a:r>
+            <a:r>
+              <a:rPr kumimoji="0" lang="en-US" altLang="en-US" sz="1200" b="0" i="0" u="none" strike="noStrike" cap="none" normalizeH="0" baseline="0" dirty="0" smtClean="0">
+                <a:ln>
+                  <a:noFill/>
+                </a:ln>
+                <a:solidFill>
+                  <a:srgbClr val="506784"/>
+                </a:solidFill>
+                <a:effectLst/>
+                <a:latin typeface="Open Sans"/>
+              </a:rPr>
+              <a:t>, while the entry point for </a:t>
+            </a:r>
+          </a:p>
+          <a:p>
+            <a:pPr marL="0" marR="0" lvl="0" indent="0" algn="l" defTabSz="914400" rtl="0" eaLnBrk="0" fontAlgn="base" latinLnBrk="0" hangingPunct="0">
+              <a:lnSpc>
+                <a:spcPct val="100000"/>
+              </a:lnSpc>
+              <a:spcBef>
+                <a:spcPct val="0"/>
+              </a:spcBef>
+              <a:spcAft>
+                <a:spcPct val="0"/>
+              </a:spcAft>
+              <a:buClrTx/>
+              <a:buSzTx/>
+              <a:buFontTx/>
+              <a:buNone/>
+              <a:tabLst/>
+            </a:pPr>
+            <a:endParaRPr lang="en-US" altLang="en-US" sz="1200" dirty="0">
+              <a:solidFill>
+                <a:srgbClr val="506784"/>
+              </a:solidFill>
+              <a:latin typeface="Open Sans"/>
+            </a:endParaRPr>
+          </a:p>
+          <a:p>
+            <a:pPr marL="0" marR="0" lvl="0" indent="0" algn="l" defTabSz="914400" rtl="0" eaLnBrk="0" fontAlgn="base" latinLnBrk="0" hangingPunct="0">
+              <a:lnSpc>
+                <a:spcPct val="100000"/>
+              </a:lnSpc>
+              <a:spcBef>
+                <a:spcPct val="0"/>
+              </a:spcBef>
+              <a:spcAft>
+                <a:spcPct val="0"/>
+              </a:spcAft>
+              <a:buClrTx/>
+              <a:buSzTx/>
+              <a:buFontTx/>
+              <a:buNone/>
+              <a:tabLst/>
+            </a:pPr>
+            <a:r>
+              <a:rPr kumimoji="0" lang="en-US" altLang="en-US" sz="1200" b="0" i="0" u="none" strike="noStrike" cap="none" normalizeH="0" baseline="0" dirty="0" smtClean="0">
+                <a:ln>
+                  <a:noFill/>
+                </a:ln>
+                <a:solidFill>
+                  <a:srgbClr val="506784"/>
+                </a:solidFill>
+                <a:effectLst/>
+                <a:latin typeface="Open Sans"/>
+              </a:rPr>
+              <a:t>running the app is </a:t>
+            </a:r>
+            <a:r>
+              <a:rPr kumimoji="0" lang="en-US" altLang="en-US" sz="900" b="0" i="0" u="none" strike="noStrike" cap="none" normalizeH="0" baseline="0" dirty="0" smtClean="0">
+                <a:ln>
+                  <a:noFill/>
+                </a:ln>
+                <a:solidFill>
+                  <a:srgbClr val="506784"/>
+                </a:solidFill>
+                <a:effectLst/>
+                <a:latin typeface="Arial Unicode MS"/>
+              </a:rPr>
+              <a:t>index.py</a:t>
+            </a:r>
+            <a:r>
+              <a:rPr kumimoji="0" lang="en-US" altLang="en-US" sz="1200" b="0" i="0" u="none" strike="noStrike" cap="none" normalizeH="0" baseline="0" dirty="0" smtClean="0">
+                <a:ln>
+                  <a:noFill/>
+                </a:ln>
+                <a:solidFill>
+                  <a:srgbClr val="506784"/>
+                </a:solidFill>
+                <a:effectLst/>
+                <a:latin typeface="Open Sans"/>
+              </a:rPr>
+              <a:t>. </a:t>
+            </a:r>
+          </a:p>
+          <a:p>
+            <a:pPr marL="0" marR="0" lvl="0" indent="0" algn="l" defTabSz="914400" rtl="0" eaLnBrk="0" fontAlgn="base" latinLnBrk="0" hangingPunct="0">
+              <a:lnSpc>
+                <a:spcPct val="100000"/>
+              </a:lnSpc>
+              <a:spcBef>
+                <a:spcPct val="0"/>
+              </a:spcBef>
+              <a:spcAft>
+                <a:spcPct val="0"/>
+              </a:spcAft>
+              <a:buClrTx/>
+              <a:buSzTx/>
+              <a:buFontTx/>
+              <a:buNone/>
+              <a:tabLst/>
+            </a:pPr>
+            <a:endParaRPr kumimoji="0" lang="en-US" altLang="en-US" sz="1200" b="0" i="0" u="none" strike="noStrike" cap="none" normalizeH="0" baseline="0" dirty="0" smtClean="0">
+              <a:ln>
+                <a:noFill/>
+              </a:ln>
+              <a:solidFill>
+                <a:srgbClr val="506784"/>
+              </a:solidFill>
+              <a:effectLst/>
+              <a:latin typeface="Open Sans"/>
+            </a:endParaRPr>
+          </a:p>
+          <a:p>
+            <a:pPr marL="0" marR="0" lvl="0" indent="0" algn="l" defTabSz="914400" rtl="0" eaLnBrk="0" fontAlgn="base" latinLnBrk="0" hangingPunct="0">
+              <a:lnSpc>
+                <a:spcPct val="100000"/>
+              </a:lnSpc>
+              <a:spcBef>
+                <a:spcPct val="0"/>
+              </a:spcBef>
+              <a:spcAft>
+                <a:spcPct val="0"/>
+              </a:spcAft>
+              <a:buClrTx/>
+              <a:buSzTx/>
+              <a:buFontTx/>
+              <a:buNone/>
+              <a:tabLst/>
+            </a:pPr>
+            <a:r>
+              <a:rPr kumimoji="0" lang="en-US" altLang="en-US" sz="1200" b="0" i="0" u="none" strike="noStrike" cap="none" normalizeH="0" baseline="0" dirty="0" smtClean="0">
+                <a:ln>
+                  <a:noFill/>
+                </a:ln>
+                <a:solidFill>
+                  <a:srgbClr val="506784"/>
+                </a:solidFill>
+                <a:effectLst/>
+                <a:latin typeface="Open Sans"/>
+              </a:rPr>
+              <a:t>This separation is required to avoid circular imports: the files containing the callback definitions require access to the </a:t>
+            </a:r>
+          </a:p>
+          <a:p>
+            <a:pPr marL="0" marR="0" lvl="0" indent="0" algn="l" defTabSz="914400" rtl="0" eaLnBrk="0" fontAlgn="base" latinLnBrk="0" hangingPunct="0">
+              <a:lnSpc>
+                <a:spcPct val="100000"/>
+              </a:lnSpc>
+              <a:spcBef>
+                <a:spcPct val="0"/>
+              </a:spcBef>
+              <a:spcAft>
+                <a:spcPct val="0"/>
+              </a:spcAft>
+              <a:buClrTx/>
+              <a:buSzTx/>
+              <a:buFontTx/>
+              <a:buNone/>
+              <a:tabLst/>
+            </a:pPr>
+            <a:endParaRPr lang="en-US" altLang="en-US" sz="1200" dirty="0">
+              <a:solidFill>
+                <a:srgbClr val="506784"/>
+              </a:solidFill>
+              <a:latin typeface="Open Sans"/>
+            </a:endParaRPr>
+          </a:p>
+          <a:p>
+            <a:pPr marL="0" marR="0" lvl="0" indent="0" algn="l" defTabSz="914400" rtl="0" eaLnBrk="0" fontAlgn="base" latinLnBrk="0" hangingPunct="0">
+              <a:lnSpc>
+                <a:spcPct val="100000"/>
+              </a:lnSpc>
+              <a:spcBef>
+                <a:spcPct val="0"/>
+              </a:spcBef>
+              <a:spcAft>
+                <a:spcPct val="0"/>
+              </a:spcAft>
+              <a:buClrTx/>
+              <a:buSzTx/>
+              <a:buFontTx/>
+              <a:buNone/>
+              <a:tabLst/>
+            </a:pPr>
+            <a:r>
+              <a:rPr kumimoji="0" lang="en-US" altLang="en-US" sz="1200" b="0" i="0" u="none" strike="noStrike" cap="none" normalizeH="0" baseline="0" dirty="0" smtClean="0">
+                <a:ln>
+                  <a:noFill/>
+                </a:ln>
+                <a:solidFill>
+                  <a:srgbClr val="506784"/>
+                </a:solidFill>
+                <a:effectLst/>
+                <a:latin typeface="Open Sans"/>
+              </a:rPr>
+              <a:t>Dash </a:t>
+            </a:r>
+            <a:r>
+              <a:rPr kumimoji="0" lang="en-US" altLang="en-US" sz="900" b="0" i="0" u="none" strike="noStrike" cap="none" normalizeH="0" baseline="0" dirty="0" smtClean="0">
+                <a:ln>
+                  <a:noFill/>
+                </a:ln>
+                <a:solidFill>
+                  <a:srgbClr val="506784"/>
+                </a:solidFill>
+                <a:effectLst/>
+                <a:latin typeface="Arial Unicode MS"/>
+              </a:rPr>
+              <a:t>app</a:t>
+            </a:r>
+            <a:r>
+              <a:rPr kumimoji="0" lang="en-US" altLang="en-US" sz="1200" b="0" i="0" u="none" strike="noStrike" cap="none" normalizeH="0" baseline="0" dirty="0" smtClean="0">
+                <a:ln>
+                  <a:noFill/>
+                </a:ln>
+                <a:solidFill>
+                  <a:srgbClr val="506784"/>
+                </a:solidFill>
+                <a:effectLst/>
+                <a:latin typeface="Open Sans"/>
+              </a:rPr>
+              <a:t> instance however if this were imported from </a:t>
+            </a:r>
+            <a:r>
+              <a:rPr kumimoji="0" lang="en-US" altLang="en-US" sz="900" b="0" i="0" u="none" strike="noStrike" cap="none" normalizeH="0" baseline="0" dirty="0" smtClean="0">
+                <a:ln>
+                  <a:noFill/>
+                </a:ln>
+                <a:solidFill>
+                  <a:srgbClr val="506784"/>
+                </a:solidFill>
+                <a:effectLst/>
+                <a:latin typeface="Arial Unicode MS"/>
+              </a:rPr>
+              <a:t>index.py</a:t>
+            </a:r>
+            <a:r>
+              <a:rPr kumimoji="0" lang="en-US" altLang="en-US" sz="1200" b="0" i="0" u="none" strike="noStrike" cap="none" normalizeH="0" baseline="0" dirty="0" smtClean="0">
+                <a:ln>
+                  <a:noFill/>
+                </a:ln>
+                <a:solidFill>
+                  <a:srgbClr val="506784"/>
+                </a:solidFill>
+                <a:effectLst/>
+                <a:latin typeface="Open Sans"/>
+              </a:rPr>
+              <a:t>, the initial loading of </a:t>
+            </a:r>
+            <a:r>
+              <a:rPr kumimoji="0" lang="en-US" altLang="en-US" sz="900" b="0" i="0" u="none" strike="noStrike" cap="none" normalizeH="0" baseline="0" dirty="0" smtClean="0">
+                <a:ln>
+                  <a:noFill/>
+                </a:ln>
+                <a:solidFill>
+                  <a:srgbClr val="506784"/>
+                </a:solidFill>
+                <a:effectLst/>
+                <a:latin typeface="Arial Unicode MS"/>
+              </a:rPr>
+              <a:t>index.py</a:t>
+            </a:r>
+            <a:r>
+              <a:rPr kumimoji="0" lang="en-US" altLang="en-US" sz="1200" b="0" i="0" u="none" strike="noStrike" cap="none" normalizeH="0" baseline="0" dirty="0" smtClean="0">
+                <a:ln>
+                  <a:noFill/>
+                </a:ln>
+                <a:solidFill>
+                  <a:srgbClr val="506784"/>
+                </a:solidFill>
+                <a:effectLst/>
+                <a:latin typeface="Open Sans"/>
+              </a:rPr>
+              <a:t> </a:t>
+            </a:r>
+          </a:p>
+          <a:p>
+            <a:pPr marL="0" marR="0" lvl="0" indent="0" algn="l" defTabSz="914400" rtl="0" eaLnBrk="0" fontAlgn="base" latinLnBrk="0" hangingPunct="0">
+              <a:lnSpc>
+                <a:spcPct val="100000"/>
+              </a:lnSpc>
+              <a:spcBef>
+                <a:spcPct val="0"/>
+              </a:spcBef>
+              <a:spcAft>
+                <a:spcPct val="0"/>
+              </a:spcAft>
+              <a:buClrTx/>
+              <a:buSzTx/>
+              <a:buFontTx/>
+              <a:buNone/>
+              <a:tabLst/>
+            </a:pPr>
+            <a:endParaRPr kumimoji="0" lang="en-US" altLang="en-US" sz="1200" b="0" i="0" u="none" strike="noStrike" cap="none" normalizeH="0" baseline="0" dirty="0" smtClean="0">
+              <a:ln>
+                <a:noFill/>
+              </a:ln>
+              <a:solidFill>
+                <a:srgbClr val="506784"/>
+              </a:solidFill>
+              <a:effectLst/>
+              <a:latin typeface="Open Sans"/>
+            </a:endParaRPr>
+          </a:p>
+          <a:p>
+            <a:pPr marL="0" marR="0" lvl="0" indent="0" algn="l" defTabSz="914400" rtl="0" eaLnBrk="0" fontAlgn="base" latinLnBrk="0" hangingPunct="0">
+              <a:lnSpc>
+                <a:spcPct val="100000"/>
+              </a:lnSpc>
+              <a:spcBef>
+                <a:spcPct val="0"/>
+              </a:spcBef>
+              <a:spcAft>
+                <a:spcPct val="0"/>
+              </a:spcAft>
+              <a:buClrTx/>
+              <a:buSzTx/>
+              <a:buFontTx/>
+              <a:buNone/>
+              <a:tabLst/>
+            </a:pPr>
+            <a:r>
+              <a:rPr kumimoji="0" lang="en-US" altLang="en-US" sz="1200" b="0" i="0" u="none" strike="noStrike" cap="none" normalizeH="0" baseline="0" dirty="0" smtClean="0">
+                <a:ln>
+                  <a:noFill/>
+                </a:ln>
+                <a:solidFill>
+                  <a:srgbClr val="506784"/>
+                </a:solidFill>
+                <a:effectLst/>
+                <a:latin typeface="Open Sans"/>
+              </a:rPr>
+              <a:t>would ultimately require itself to be already imported, which cannot be satisfied.</a:t>
+            </a:r>
+            <a:r>
+              <a:rPr kumimoji="0" lang="en-US" altLang="en-US" sz="600" b="0" i="0" u="none" strike="noStrike" cap="none" normalizeH="0" baseline="0" dirty="0" smtClean="0">
+                <a:ln>
+                  <a:noFill/>
+                </a:ln>
+                <a:solidFill>
+                  <a:schemeClr val="tx1"/>
+                </a:solidFill>
+                <a:effectLst/>
+              </a:rPr>
+              <a:t> </a:t>
+            </a:r>
+          </a:p>
+          <a:p>
+            <a:pPr marL="0" marR="0" lvl="0" indent="0" algn="l" defTabSz="914400" rtl="0" eaLnBrk="0" fontAlgn="base" latinLnBrk="0" hangingPunct="0">
+              <a:lnSpc>
+                <a:spcPct val="100000"/>
+              </a:lnSpc>
+              <a:spcBef>
+                <a:spcPct val="0"/>
+              </a:spcBef>
+              <a:spcAft>
+                <a:spcPct val="0"/>
+              </a:spcAft>
+              <a:buClrTx/>
+              <a:buSzTx/>
+              <a:buFontTx/>
+              <a:buNone/>
+              <a:tabLst/>
+            </a:pPr>
+            <a:endParaRPr lang="en-US" altLang="en-US" sz="600" dirty="0">
+              <a:latin typeface="Arial" panose="020B0604020202020204" pitchFamily="34" charset="0"/>
+            </a:endParaRPr>
+          </a:p>
+          <a:p>
+            <a:pPr marL="0" marR="0" lvl="0" indent="0" algn="l" defTabSz="914400" rtl="0" eaLnBrk="0" fontAlgn="base" latinLnBrk="0" hangingPunct="0">
+              <a:lnSpc>
+                <a:spcPct val="100000"/>
+              </a:lnSpc>
+              <a:spcBef>
+                <a:spcPct val="0"/>
+              </a:spcBef>
+              <a:spcAft>
+                <a:spcPct val="0"/>
+              </a:spcAft>
+              <a:buClrTx/>
+              <a:buSzTx/>
+              <a:buFontTx/>
+              <a:buNone/>
+              <a:tabLst/>
+            </a:pPr>
+            <a:endParaRPr kumimoji="0" lang="en-US" altLang="en-US" sz="600" b="0" i="0" u="none" strike="noStrike" cap="none" normalizeH="0" baseline="0" dirty="0" smtClean="0">
+              <a:ln>
+                <a:noFill/>
+              </a:ln>
+              <a:solidFill>
+                <a:schemeClr val="tx1"/>
+              </a:solidFill>
+              <a:effectLst/>
+            </a:endParaRPr>
+          </a:p>
+          <a:p>
+            <a:pPr marL="0" marR="0" lvl="0" indent="0" algn="l" defTabSz="914400" rtl="0" eaLnBrk="0" fontAlgn="base" latinLnBrk="0" hangingPunct="0">
+              <a:lnSpc>
+                <a:spcPct val="100000"/>
+              </a:lnSpc>
+              <a:spcBef>
+                <a:spcPct val="0"/>
+              </a:spcBef>
+              <a:spcAft>
+                <a:spcPct val="0"/>
+              </a:spcAft>
+              <a:buClrTx/>
+              <a:buSzTx/>
+              <a:buFontTx/>
+              <a:buNone/>
+              <a:tabLst/>
+            </a:pPr>
+            <a:endParaRPr lang="en-US" altLang="en-US" sz="600" dirty="0">
+              <a:latin typeface="Arial" panose="020B0604020202020204" pitchFamily="34" charset="0"/>
+            </a:endParaRPr>
+          </a:p>
+          <a:p>
+            <a:pPr marL="0" marR="0" lvl="0" indent="0" algn="l" defTabSz="914400" rtl="0" eaLnBrk="0" fontAlgn="base" latinLnBrk="0" hangingPunct="0">
+              <a:lnSpc>
+                <a:spcPct val="100000"/>
+              </a:lnSpc>
+              <a:spcBef>
+                <a:spcPct val="0"/>
+              </a:spcBef>
+              <a:spcAft>
+                <a:spcPct val="0"/>
+              </a:spcAft>
+              <a:buClrTx/>
+              <a:buSzTx/>
+              <a:buFontTx/>
+              <a:buNone/>
+              <a:tabLst/>
+            </a:pPr>
+            <a:endParaRPr kumimoji="0" lang="en-US" altLang="en-US" sz="600" b="0" i="0" u="none" strike="noStrike" cap="none" normalizeH="0" baseline="0" dirty="0" smtClean="0">
+              <a:ln>
+                <a:noFill/>
+              </a:ln>
+              <a:solidFill>
+                <a:schemeClr val="tx1"/>
+              </a:solidFill>
+              <a:effectLst/>
+            </a:endParaRPr>
+          </a:p>
+          <a:p>
+            <a:pPr marL="0" marR="0" lvl="0" indent="0" algn="l" defTabSz="914400" rtl="0" eaLnBrk="0" fontAlgn="base" latinLnBrk="0" hangingPunct="0">
+              <a:lnSpc>
+                <a:spcPct val="100000"/>
+              </a:lnSpc>
+              <a:spcBef>
+                <a:spcPct val="0"/>
+              </a:spcBef>
+              <a:spcAft>
+                <a:spcPct val="0"/>
+              </a:spcAft>
+              <a:buClrTx/>
+              <a:buSzTx/>
+              <a:buFontTx/>
+              <a:buNone/>
+              <a:tabLst/>
+            </a:pPr>
+            <a:endParaRPr lang="en-US" altLang="en-US" sz="600" dirty="0">
+              <a:latin typeface="Arial" panose="020B0604020202020204" pitchFamily="34" charset="0"/>
+            </a:endParaRPr>
+          </a:p>
+          <a:p>
+            <a:pPr marL="0" marR="0" lvl="0" indent="0" algn="l" defTabSz="914400" rtl="0" eaLnBrk="0" fontAlgn="base" latinLnBrk="0" hangingPunct="0">
+              <a:lnSpc>
+                <a:spcPct val="100000"/>
+              </a:lnSpc>
+              <a:spcBef>
+                <a:spcPct val="0"/>
+              </a:spcBef>
+              <a:spcAft>
+                <a:spcPct val="0"/>
+              </a:spcAft>
+              <a:buClrTx/>
+              <a:buSzTx/>
+              <a:buFontTx/>
+              <a:buNone/>
+              <a:tabLst/>
+            </a:pPr>
+            <a:endParaRPr kumimoji="0" lang="en-US" altLang="en-US" sz="600" b="0" i="0" u="none" strike="noStrike" cap="none" normalizeH="0" baseline="0" dirty="0" smtClean="0">
+              <a:ln>
+                <a:noFill/>
+              </a:ln>
+              <a:solidFill>
+                <a:schemeClr val="tx1"/>
+              </a:solidFill>
+              <a:effectLst/>
+            </a:endParaRPr>
+          </a:p>
+          <a:p>
+            <a:pPr marL="0" marR="0" lvl="0" indent="0" algn="l" defTabSz="914400" rtl="0" eaLnBrk="0" fontAlgn="base" latinLnBrk="0" hangingPunct="0">
+              <a:lnSpc>
+                <a:spcPct val="100000"/>
+              </a:lnSpc>
+              <a:spcBef>
+                <a:spcPct val="0"/>
+              </a:spcBef>
+              <a:spcAft>
+                <a:spcPct val="0"/>
+              </a:spcAft>
+              <a:buClrTx/>
+              <a:buSzTx/>
+              <a:buFontTx/>
+              <a:buNone/>
+              <a:tabLst/>
+            </a:pPr>
+            <a:endParaRPr lang="en-US" altLang="en-US" sz="600" dirty="0">
+              <a:latin typeface="Arial" panose="020B0604020202020204" pitchFamily="34" charset="0"/>
+            </a:endParaRPr>
+          </a:p>
+          <a:p>
+            <a:pPr marL="0" marR="0" lvl="0" indent="0" algn="l" defTabSz="914400" rtl="0" eaLnBrk="0" fontAlgn="base" latinLnBrk="0" hangingPunct="0">
+              <a:lnSpc>
+                <a:spcPct val="100000"/>
+              </a:lnSpc>
+              <a:spcBef>
+                <a:spcPct val="0"/>
+              </a:spcBef>
+              <a:spcAft>
+                <a:spcPct val="0"/>
+              </a:spcAft>
+              <a:buClrTx/>
+              <a:buSzTx/>
+              <a:buFontTx/>
+              <a:buNone/>
+              <a:tabLst/>
+            </a:pPr>
+            <a:endParaRPr kumimoji="0" lang="en-US" altLang="en-US" sz="600" b="0" i="0" u="none" strike="noStrike" cap="none" normalizeH="0" baseline="0" dirty="0" smtClean="0">
+              <a:ln>
+                <a:noFill/>
+              </a:ln>
+              <a:solidFill>
+                <a:schemeClr val="tx1"/>
+              </a:solidFill>
+              <a:effectLst/>
+            </a:endParaRPr>
+          </a:p>
+          <a:p>
+            <a:pPr marL="0" marR="0" lvl="0" indent="0" algn="l" defTabSz="914400" rtl="0" eaLnBrk="0" fontAlgn="base" latinLnBrk="0" hangingPunct="0">
+              <a:lnSpc>
+                <a:spcPct val="100000"/>
+              </a:lnSpc>
+              <a:spcBef>
+                <a:spcPct val="0"/>
+              </a:spcBef>
+              <a:spcAft>
+                <a:spcPct val="0"/>
+              </a:spcAft>
+              <a:buClrTx/>
+              <a:buSzTx/>
+              <a:buFontTx/>
+              <a:buNone/>
+              <a:tabLst/>
+            </a:pPr>
+            <a:endParaRPr lang="en-US" altLang="en-US" sz="600" dirty="0">
+              <a:latin typeface="Arial" panose="020B0604020202020204" pitchFamily="34" charset="0"/>
+            </a:endParaRPr>
+          </a:p>
+          <a:p>
+            <a:pPr marL="0" marR="0" lvl="0" indent="0" algn="l" defTabSz="914400" rtl="0" eaLnBrk="0" fontAlgn="base" latinLnBrk="0" hangingPunct="0">
+              <a:lnSpc>
+                <a:spcPct val="100000"/>
+              </a:lnSpc>
+              <a:spcBef>
+                <a:spcPct val="0"/>
+              </a:spcBef>
+              <a:spcAft>
+                <a:spcPct val="0"/>
+              </a:spcAft>
+              <a:buClrTx/>
+              <a:buSzTx/>
+              <a:buFontTx/>
+              <a:buNone/>
+              <a:tabLst/>
+            </a:pPr>
+            <a:endParaRPr kumimoji="0" lang="en-US" altLang="en-US" sz="600" b="0" i="0" u="none" strike="noStrike" cap="none" normalizeH="0" baseline="0" dirty="0" smtClean="0">
+              <a:ln>
+                <a:noFill/>
+              </a:ln>
+              <a:solidFill>
+                <a:schemeClr val="tx1"/>
+              </a:solidFill>
+              <a:effectLst/>
+            </a:endParaRPr>
+          </a:p>
+          <a:p>
+            <a:pPr marL="0" marR="0" lvl="0" indent="0" algn="l" defTabSz="914400" rtl="0" eaLnBrk="0" fontAlgn="base" latinLnBrk="0" hangingPunct="0">
+              <a:lnSpc>
+                <a:spcPct val="100000"/>
+              </a:lnSpc>
+              <a:spcBef>
+                <a:spcPct val="0"/>
+              </a:spcBef>
+              <a:spcAft>
+                <a:spcPct val="0"/>
+              </a:spcAft>
+              <a:buClrTx/>
+              <a:buSzTx/>
+              <a:buFontTx/>
+              <a:buNone/>
+              <a:tabLst/>
+            </a:pPr>
+            <a:endParaRPr kumimoji="0" lang="en-US" altLang="en-US" sz="1800" b="0" i="0" u="none" strike="noStrike" cap="none" normalizeH="0" baseline="0" dirty="0" smtClean="0">
+              <a:ln>
+                <a:noFill/>
+              </a:ln>
+              <a:solidFill>
+                <a:schemeClr val="tx1"/>
+              </a:solidFill>
+              <a:effectLst/>
+              <a:latin typeface="Arial" panose="020B0604020202020204" pitchFamily="34" charset="0"/>
+            </a:endParaRPr>
+          </a:p>
+        </p:txBody>
+      </p:sp>
+    </p:spTree>
+    <p:extLst>
+      <p:ext uri="{BB962C8B-B14F-4D97-AF65-F5344CB8AC3E}">
+        <p14:creationId xmlns:p14="http://schemas.microsoft.com/office/powerpoint/2010/main" val="2525738183"/>
+      </p:ext>
+    </p:extLst>
+  </p:cSld>
+  <p:clrMapOvr>
+    <a:masterClrMapping/>
+  </p:clrMapOvr>
+</p:sld>
+</file>
+
+<file path=ppt/slides/slide8.xml><?xml version="1.0" encoding="utf-8"?>
 <p:sld xmlns:a="http://schemas.openxmlformats.org/drawingml/2006/main" xmlns:r="http://schemas.openxmlformats.org/officeDocument/2006/relationships" xmlns:p="http://schemas.openxmlformats.org/presentationml/2006/main">
   <p:cSld>
     <p:spTree>
@@ -6085,7 +9569,7 @@
 </p:sld>
 </file>
 
-<file path=ppt/slides/slide5.xml><?xml version="1.0" encoding="utf-8"?>
+<file path=ppt/slides/slide9.xml><?xml version="1.0" encoding="utf-8"?>
 <p:sld xmlns:a="http://schemas.openxmlformats.org/drawingml/2006/main" xmlns:r="http://schemas.openxmlformats.org/officeDocument/2006/relationships" xmlns:p="http://schemas.openxmlformats.org/presentationml/2006/main">
   <p:cSld>
     <p:spTree>
@@ -6217,502 +9701,6 @@
     <p:extLst>
       <p:ext uri="{BB962C8B-B14F-4D97-AF65-F5344CB8AC3E}">
         <p14:creationId xmlns:p14="http://schemas.microsoft.com/office/powerpoint/2010/main" val="2017165027"/>
-      </p:ext>
-    </p:extLst>
-  </p:cSld>
-  <p:clrMapOvr>
-    <a:masterClrMapping/>
-  </p:clrMapOvr>
-  <p:timing>
-    <p:tnLst>
-      <p:par>
-        <p:cTn id="1" dur="indefinite" restart="never" nodeType="tmRoot"/>
-      </p:par>
-    </p:tnLst>
-  </p:timing>
-</p:sld>
-</file>
-
-<file path=ppt/slides/slide6.xml><?xml version="1.0" encoding="utf-8"?>
-<p:sld xmlns:a="http://schemas.openxmlformats.org/drawingml/2006/main" xmlns:r="http://schemas.openxmlformats.org/officeDocument/2006/relationships" xmlns:p="http://schemas.openxmlformats.org/presentationml/2006/main">
-  <p:cSld>
-    <p:spTree>
-      <p:nvGrpSpPr>
-        <p:cNvPr id="1" name=""/>
-        <p:cNvGrpSpPr/>
-        <p:nvPr/>
-      </p:nvGrpSpPr>
-      <p:grpSpPr>
-        <a:xfrm>
-          <a:off x="0" y="0"/>
-          <a:ext cx="0" cy="0"/>
-          <a:chOff x="0" y="0"/>
-          <a:chExt cx="0" cy="0"/>
-        </a:xfrm>
-      </p:grpSpPr>
-      <p:sp>
-        <p:nvSpPr>
-          <p:cNvPr id="2" name="Text Placeholder 1"/>
-          <p:cNvSpPr>
-            <a:spLocks noGrp="1"/>
-          </p:cNvSpPr>
-          <p:nvPr>
-            <p:ph type="body" sz="quarter" idx="14"/>
-          </p:nvPr>
-        </p:nvSpPr>
-        <p:spPr/>
-        <p:txBody>
-          <a:bodyPr/>
-          <a:lstStyle/>
-          <a:p>
-            <a:endParaRPr lang="en-US"/>
-          </a:p>
-        </p:txBody>
-      </p:sp>
-      <p:sp>
-        <p:nvSpPr>
-          <p:cNvPr id="3" name="Text Placeholder 2"/>
-          <p:cNvSpPr>
-            <a:spLocks noGrp="1"/>
-          </p:cNvSpPr>
-          <p:nvPr>
-            <p:ph type="body" sz="quarter" idx="13"/>
-          </p:nvPr>
-        </p:nvSpPr>
-        <p:spPr/>
-        <p:txBody>
-          <a:bodyPr/>
-          <a:lstStyle/>
-          <a:p>
-            <a:endParaRPr lang="en-US"/>
-          </a:p>
-        </p:txBody>
-      </p:sp>
-      <p:sp>
-        <p:nvSpPr>
-          <p:cNvPr id="4" name="Title 3"/>
-          <p:cNvSpPr>
-            <a:spLocks noGrp="1"/>
-          </p:cNvSpPr>
-          <p:nvPr>
-            <p:ph type="title"/>
-          </p:nvPr>
-        </p:nvSpPr>
-        <p:spPr/>
-        <p:txBody>
-          <a:bodyPr/>
-          <a:lstStyle/>
-          <a:p>
-            <a:endParaRPr lang="en-US"/>
-          </a:p>
-        </p:txBody>
-      </p:sp>
-      <p:pic>
-        <p:nvPicPr>
-          <p:cNvPr id="5" name="Picture 4" descr="Screen Clipping"/>
-          <p:cNvPicPr>
-            <a:picLocks noChangeAspect="1"/>
-          </p:cNvPicPr>
-          <p:nvPr/>
-        </p:nvPicPr>
-        <p:blipFill>
-          <a:blip r:embed="rId2">
-            <a:extLst>
-              <a:ext uri="{28A0092B-C50C-407E-A947-70E740481C1C}">
-                <a14:useLocalDpi xmlns:a14="http://schemas.microsoft.com/office/drawing/2010/main" val="0"/>
-              </a:ext>
-            </a:extLst>
-          </a:blip>
-          <a:stretch>
-            <a:fillRect/>
-          </a:stretch>
-        </p:blipFill>
-        <p:spPr>
-          <a:xfrm>
-            <a:off x="0" y="0"/>
-            <a:ext cx="9144000" cy="6858000"/>
-          </a:xfrm>
-          <a:prstGeom prst="rect">
-            <a:avLst/>
-          </a:prstGeom>
-        </p:spPr>
-      </p:pic>
-    </p:spTree>
-    <p:extLst>
-      <p:ext uri="{BB962C8B-B14F-4D97-AF65-F5344CB8AC3E}">
-        <p14:creationId xmlns:p14="http://schemas.microsoft.com/office/powerpoint/2010/main" val="2467848603"/>
-      </p:ext>
-    </p:extLst>
-  </p:cSld>
-  <p:clrMapOvr>
-    <a:masterClrMapping/>
-  </p:clrMapOvr>
-  <p:timing>
-    <p:tnLst>
-      <p:par>
-        <p:cTn id="1" dur="indefinite" restart="never" nodeType="tmRoot"/>
-      </p:par>
-    </p:tnLst>
-  </p:timing>
-</p:sld>
-</file>
-
-<file path=ppt/slides/slide7.xml><?xml version="1.0" encoding="utf-8"?>
-<p:sld xmlns:a="http://schemas.openxmlformats.org/drawingml/2006/main" xmlns:r="http://schemas.openxmlformats.org/officeDocument/2006/relationships" xmlns:p="http://schemas.openxmlformats.org/presentationml/2006/main">
-  <p:cSld>
-    <p:spTree>
-      <p:nvGrpSpPr>
-        <p:cNvPr id="1" name=""/>
-        <p:cNvGrpSpPr/>
-        <p:nvPr/>
-      </p:nvGrpSpPr>
-      <p:grpSpPr>
-        <a:xfrm>
-          <a:off x="0" y="0"/>
-          <a:ext cx="0" cy="0"/>
-          <a:chOff x="0" y="0"/>
-          <a:chExt cx="0" cy="0"/>
-        </a:xfrm>
-      </p:grpSpPr>
-      <p:sp>
-        <p:nvSpPr>
-          <p:cNvPr id="2" name="Text Placeholder 1"/>
-          <p:cNvSpPr>
-            <a:spLocks noGrp="1"/>
-          </p:cNvSpPr>
-          <p:nvPr>
-            <p:ph type="body" sz="quarter" idx="14"/>
-          </p:nvPr>
-        </p:nvSpPr>
-        <p:spPr/>
-        <p:txBody>
-          <a:bodyPr/>
-          <a:lstStyle/>
-          <a:p>
-            <a:endParaRPr lang="en-US"/>
-          </a:p>
-        </p:txBody>
-      </p:sp>
-      <p:sp>
-        <p:nvSpPr>
-          <p:cNvPr id="3" name="Text Placeholder 2"/>
-          <p:cNvSpPr>
-            <a:spLocks noGrp="1"/>
-          </p:cNvSpPr>
-          <p:nvPr>
-            <p:ph type="body" sz="quarter" idx="13"/>
-          </p:nvPr>
-        </p:nvSpPr>
-        <p:spPr/>
-        <p:txBody>
-          <a:bodyPr/>
-          <a:lstStyle/>
-          <a:p>
-            <a:endParaRPr lang="en-US"/>
-          </a:p>
-        </p:txBody>
-      </p:sp>
-      <p:sp>
-        <p:nvSpPr>
-          <p:cNvPr id="4" name="Title 3"/>
-          <p:cNvSpPr>
-            <a:spLocks noGrp="1"/>
-          </p:cNvSpPr>
-          <p:nvPr>
-            <p:ph type="title"/>
-          </p:nvPr>
-        </p:nvSpPr>
-        <p:spPr/>
-        <p:txBody>
-          <a:bodyPr/>
-          <a:lstStyle/>
-          <a:p>
-            <a:endParaRPr lang="en-US"/>
-          </a:p>
-        </p:txBody>
-      </p:sp>
-      <p:pic>
-        <p:nvPicPr>
-          <p:cNvPr id="5" name="Picture 4" descr="Screen Clipping"/>
-          <p:cNvPicPr>
-            <a:picLocks noChangeAspect="1"/>
-          </p:cNvPicPr>
-          <p:nvPr/>
-        </p:nvPicPr>
-        <p:blipFill>
-          <a:blip r:embed="rId2">
-            <a:extLst>
-              <a:ext uri="{28A0092B-C50C-407E-A947-70E740481C1C}">
-                <a14:useLocalDpi xmlns:a14="http://schemas.microsoft.com/office/drawing/2010/main" val="0"/>
-              </a:ext>
-            </a:extLst>
-          </a:blip>
-          <a:stretch>
-            <a:fillRect/>
-          </a:stretch>
-        </p:blipFill>
-        <p:spPr>
-          <a:xfrm>
-            <a:off x="0" y="0"/>
-            <a:ext cx="9144000" cy="6857999"/>
-          </a:xfrm>
-          <a:prstGeom prst="rect">
-            <a:avLst/>
-          </a:prstGeom>
-        </p:spPr>
-      </p:pic>
-    </p:spTree>
-    <p:extLst>
-      <p:ext uri="{BB962C8B-B14F-4D97-AF65-F5344CB8AC3E}">
-        <p14:creationId xmlns:p14="http://schemas.microsoft.com/office/powerpoint/2010/main" val="869784362"/>
-      </p:ext>
-    </p:extLst>
-  </p:cSld>
-  <p:clrMapOvr>
-    <a:masterClrMapping/>
-  </p:clrMapOvr>
-  <p:timing>
-    <p:tnLst>
-      <p:par>
-        <p:cTn id="1" dur="indefinite" restart="never" nodeType="tmRoot"/>
-      </p:par>
-    </p:tnLst>
-  </p:timing>
-</p:sld>
-</file>
-
-<file path=ppt/slides/slide8.xml><?xml version="1.0" encoding="utf-8"?>
-<p:sld xmlns:a="http://schemas.openxmlformats.org/drawingml/2006/main" xmlns:r="http://schemas.openxmlformats.org/officeDocument/2006/relationships" xmlns:p="http://schemas.openxmlformats.org/presentationml/2006/main">
-  <p:cSld>
-    <p:spTree>
-      <p:nvGrpSpPr>
-        <p:cNvPr id="1" name=""/>
-        <p:cNvGrpSpPr/>
-        <p:nvPr/>
-      </p:nvGrpSpPr>
-      <p:grpSpPr>
-        <a:xfrm>
-          <a:off x="0" y="0"/>
-          <a:ext cx="0" cy="0"/>
-          <a:chOff x="0" y="0"/>
-          <a:chExt cx="0" cy="0"/>
-        </a:xfrm>
-      </p:grpSpPr>
-      <p:sp>
-        <p:nvSpPr>
-          <p:cNvPr id="2" name="Text Placeholder 1"/>
-          <p:cNvSpPr>
-            <a:spLocks noGrp="1"/>
-          </p:cNvSpPr>
-          <p:nvPr>
-            <p:ph type="body" sz="quarter" idx="14"/>
-          </p:nvPr>
-        </p:nvSpPr>
-        <p:spPr/>
-        <p:txBody>
-          <a:bodyPr/>
-          <a:lstStyle/>
-          <a:p>
-            <a:endParaRPr lang="en-US"/>
-          </a:p>
-        </p:txBody>
-      </p:sp>
-      <p:sp>
-        <p:nvSpPr>
-          <p:cNvPr id="3" name="Text Placeholder 2"/>
-          <p:cNvSpPr>
-            <a:spLocks noGrp="1"/>
-          </p:cNvSpPr>
-          <p:nvPr>
-            <p:ph type="body" sz="quarter" idx="13"/>
-          </p:nvPr>
-        </p:nvSpPr>
-        <p:spPr/>
-        <p:txBody>
-          <a:bodyPr/>
-          <a:lstStyle/>
-          <a:p>
-            <a:endParaRPr lang="en-US"/>
-          </a:p>
-        </p:txBody>
-      </p:sp>
-      <p:sp>
-        <p:nvSpPr>
-          <p:cNvPr id="4" name="Title 3"/>
-          <p:cNvSpPr>
-            <a:spLocks noGrp="1"/>
-          </p:cNvSpPr>
-          <p:nvPr>
-            <p:ph type="title"/>
-          </p:nvPr>
-        </p:nvSpPr>
-        <p:spPr/>
-        <p:txBody>
-          <a:bodyPr/>
-          <a:lstStyle/>
-          <a:p>
-            <a:endParaRPr lang="en-US"/>
-          </a:p>
-        </p:txBody>
-      </p:sp>
-      <p:pic>
-        <p:nvPicPr>
-          <p:cNvPr id="5" name="Picture 4" descr="Screen Clipping"/>
-          <p:cNvPicPr>
-            <a:picLocks noChangeAspect="1"/>
-          </p:cNvPicPr>
-          <p:nvPr/>
-        </p:nvPicPr>
-        <p:blipFill>
-          <a:blip r:embed="rId2">
-            <a:extLst>
-              <a:ext uri="{28A0092B-C50C-407E-A947-70E740481C1C}">
-                <a14:useLocalDpi xmlns:a14="http://schemas.microsoft.com/office/drawing/2010/main" val="0"/>
-              </a:ext>
-            </a:extLst>
-          </a:blip>
-          <a:stretch>
-            <a:fillRect/>
-          </a:stretch>
-        </p:blipFill>
-        <p:spPr>
-          <a:xfrm>
-            <a:off x="0" y="0"/>
-            <a:ext cx="9144000" cy="6857999"/>
-          </a:xfrm>
-          <a:prstGeom prst="rect">
-            <a:avLst/>
-          </a:prstGeom>
-        </p:spPr>
-      </p:pic>
-    </p:spTree>
-    <p:extLst>
-      <p:ext uri="{BB962C8B-B14F-4D97-AF65-F5344CB8AC3E}">
-        <p14:creationId xmlns:p14="http://schemas.microsoft.com/office/powerpoint/2010/main" val="3674566202"/>
-      </p:ext>
-    </p:extLst>
-  </p:cSld>
-  <p:clrMapOvr>
-    <a:masterClrMapping/>
-  </p:clrMapOvr>
-  <p:timing>
-    <p:tnLst>
-      <p:par>
-        <p:cTn id="1" dur="indefinite" restart="never" nodeType="tmRoot"/>
-      </p:par>
-    </p:tnLst>
-  </p:timing>
-</p:sld>
-</file>
-
-<file path=ppt/slides/slide9.xml><?xml version="1.0" encoding="utf-8"?>
-<p:sld xmlns:a="http://schemas.openxmlformats.org/drawingml/2006/main" xmlns:r="http://schemas.openxmlformats.org/officeDocument/2006/relationships" xmlns:p="http://schemas.openxmlformats.org/presentationml/2006/main">
-  <p:cSld>
-    <p:spTree>
-      <p:nvGrpSpPr>
-        <p:cNvPr id="1" name=""/>
-        <p:cNvGrpSpPr/>
-        <p:nvPr/>
-      </p:nvGrpSpPr>
-      <p:grpSpPr>
-        <a:xfrm>
-          <a:off x="0" y="0"/>
-          <a:ext cx="0" cy="0"/>
-          <a:chOff x="0" y="0"/>
-          <a:chExt cx="0" cy="0"/>
-        </a:xfrm>
-      </p:grpSpPr>
-      <p:sp>
-        <p:nvSpPr>
-          <p:cNvPr id="2" name="Text Placeholder 1"/>
-          <p:cNvSpPr>
-            <a:spLocks noGrp="1"/>
-          </p:cNvSpPr>
-          <p:nvPr>
-            <p:ph type="body" sz="quarter" idx="14"/>
-          </p:nvPr>
-        </p:nvSpPr>
-        <p:spPr/>
-        <p:txBody>
-          <a:bodyPr/>
-          <a:lstStyle/>
-          <a:p>
-            <a:endParaRPr lang="en-US"/>
-          </a:p>
-        </p:txBody>
-      </p:sp>
-      <p:sp>
-        <p:nvSpPr>
-          <p:cNvPr id="3" name="Text Placeholder 2"/>
-          <p:cNvSpPr>
-            <a:spLocks noGrp="1"/>
-          </p:cNvSpPr>
-          <p:nvPr>
-            <p:ph type="body" sz="quarter" idx="13"/>
-          </p:nvPr>
-        </p:nvSpPr>
-        <p:spPr/>
-        <p:txBody>
-          <a:bodyPr/>
-          <a:lstStyle/>
-          <a:p>
-            <a:endParaRPr lang="en-US"/>
-          </a:p>
-        </p:txBody>
-      </p:sp>
-      <p:sp>
-        <p:nvSpPr>
-          <p:cNvPr id="4" name="Title 3"/>
-          <p:cNvSpPr>
-            <a:spLocks noGrp="1"/>
-          </p:cNvSpPr>
-          <p:nvPr>
-            <p:ph type="title"/>
-          </p:nvPr>
-        </p:nvSpPr>
-        <p:spPr/>
-        <p:txBody>
-          <a:bodyPr/>
-          <a:lstStyle/>
-          <a:p>
-            <a:endParaRPr lang="en-US"/>
-          </a:p>
-        </p:txBody>
-      </p:sp>
-      <p:pic>
-        <p:nvPicPr>
-          <p:cNvPr id="5" name="Picture 4" descr="Screen Clipping"/>
-          <p:cNvPicPr>
-            <a:picLocks noChangeAspect="1"/>
-          </p:cNvPicPr>
-          <p:nvPr/>
-        </p:nvPicPr>
-        <p:blipFill>
-          <a:blip r:embed="rId2">
-            <a:extLst>
-              <a:ext uri="{28A0092B-C50C-407E-A947-70E740481C1C}">
-                <a14:useLocalDpi xmlns:a14="http://schemas.microsoft.com/office/drawing/2010/main" val="0"/>
-              </a:ext>
-            </a:extLst>
-          </a:blip>
-          <a:stretch>
-            <a:fillRect/>
-          </a:stretch>
-        </p:blipFill>
-        <p:spPr>
-          <a:xfrm>
-            <a:off x="0" y="0"/>
-            <a:ext cx="9144000" cy="6858000"/>
-          </a:xfrm>
-          <a:prstGeom prst="rect">
-            <a:avLst/>
-          </a:prstGeom>
-        </p:spPr>
-      </p:pic>
-    </p:spTree>
-    <p:extLst>
-      <p:ext uri="{BB962C8B-B14F-4D97-AF65-F5344CB8AC3E}">
-        <p14:creationId xmlns:p14="http://schemas.microsoft.com/office/powerpoint/2010/main" val="1273004193"/>
       </p:ext>
     </p:extLst>
   </p:cSld>

</xml_diff>